<commit_message>
Day 9 and Day 10 content updated
</commit_message>
<xml_diff>
--- a/Day10/DockerAndKubernetes_Training-Day10.pptx
+++ b/Day10/DockerAndKubernetes_Training-Day10.pptx
@@ -5,13 +5,15 @@
     <p:sldMasterId id="2147483880" r:id="rId1"/>
   </p:sldMasterIdLst>
   <p:notesMasterIdLst>
-    <p:notesMasterId r:id="rId6"/>
+    <p:notesMasterId r:id="rId8"/>
   </p:notesMasterIdLst>
   <p:sldIdLst>
     <p:sldId id="439" r:id="rId2"/>
     <p:sldId id="442" r:id="rId3"/>
-    <p:sldId id="267" r:id="rId4"/>
-    <p:sldId id="438" r:id="rId5"/>
+    <p:sldId id="443" r:id="rId4"/>
+    <p:sldId id="266" r:id="rId5"/>
+    <p:sldId id="288" r:id="rId6"/>
+    <p:sldId id="438" r:id="rId7"/>
   </p:sldIdLst>
   <p:sldSz cx="12192000" cy="6858000"/>
   <p:notesSz cx="6858000" cy="9144000"/>
@@ -200,7 +202,7 @@
           <a:p>
             <a:fld id="{B09F413D-6E72-4B8A-80ED-A580F7C91B71}" type="datetimeFigureOut">
               <a:rPr lang="en-IN" smtClean="0"/>
-              <a:t>17-04-2023</a:t>
+              <a:t>19-04-2023</a:t>
             </a:fld>
             <a:endParaRPr lang="en-IN"/>
           </a:p>
@@ -468,6 +470,90 @@
 </p:notesMaster>
 </file>
 
+<file path=ppt/notesSlides/notesSlide1.xml><?xml version="1.0" encoding="utf-8"?>
+<p:notes xmlns:a="http://schemas.openxmlformats.org/drawingml/2006/main" xmlns:r="http://schemas.openxmlformats.org/officeDocument/2006/relationships" xmlns:p="http://schemas.openxmlformats.org/presentationml/2006/main">
+  <p:cSld>
+    <p:spTree>
+      <p:nvGrpSpPr>
+        <p:cNvPr id="1" name=""/>
+        <p:cNvGrpSpPr/>
+        <p:nvPr/>
+      </p:nvGrpSpPr>
+      <p:grpSpPr>
+        <a:xfrm>
+          <a:off x="0" y="0"/>
+          <a:ext cx="0" cy="0"/>
+          <a:chOff x="0" y="0"/>
+          <a:chExt cx="0" cy="0"/>
+        </a:xfrm>
+      </p:grpSpPr>
+      <p:sp>
+        <p:nvSpPr>
+          <p:cNvPr id="2" name="Slide Image Placeholder 1"/>
+          <p:cNvSpPr>
+            <a:spLocks noGrp="1" noRot="1" noChangeAspect="1"/>
+          </p:cNvSpPr>
+          <p:nvPr>
+            <p:ph type="sldImg"/>
+          </p:nvPr>
+        </p:nvSpPr>
+        <p:spPr/>
+      </p:sp>
+      <p:sp>
+        <p:nvSpPr>
+          <p:cNvPr id="3" name="Notes Placeholder 2"/>
+          <p:cNvSpPr>
+            <a:spLocks noGrp="1"/>
+          </p:cNvSpPr>
+          <p:nvPr>
+            <p:ph type="body" idx="1"/>
+          </p:nvPr>
+        </p:nvSpPr>
+        <p:spPr/>
+        <p:txBody>
+          <a:bodyPr/>
+          <a:lstStyle/>
+          <a:p>
+            <a:endParaRPr lang="en-IN" dirty="0"/>
+          </a:p>
+        </p:txBody>
+      </p:sp>
+      <p:sp>
+        <p:nvSpPr>
+          <p:cNvPr id="4" name="Slide Number Placeholder 3"/>
+          <p:cNvSpPr>
+            <a:spLocks noGrp="1"/>
+          </p:cNvSpPr>
+          <p:nvPr>
+            <p:ph type="sldNum" sz="quarter" idx="5"/>
+          </p:nvPr>
+        </p:nvSpPr>
+        <p:spPr/>
+        <p:txBody>
+          <a:bodyPr/>
+          <a:lstStyle/>
+          <a:p>
+            <a:fld id="{6A606295-A8FB-4F0B-A402-E245B71E1CAD}" type="slidenum">
+              <a:rPr lang="en-IN" smtClean="0"/>
+              <a:t>2</a:t>
+            </a:fld>
+            <a:endParaRPr lang="en-IN"/>
+          </a:p>
+        </p:txBody>
+      </p:sp>
+    </p:spTree>
+    <p:extLst>
+      <p:ext uri="{BB962C8B-B14F-4D97-AF65-F5344CB8AC3E}">
+        <p14:creationId xmlns:p14="http://schemas.microsoft.com/office/powerpoint/2010/main" val="1433763460"/>
+      </p:ext>
+    </p:extLst>
+  </p:cSld>
+  <p:clrMapOvr>
+    <a:masterClrMapping/>
+  </p:clrMapOvr>
+</p:notes>
+</file>
+
 <file path=ppt/slideLayouts/slideLayout1.xml><?xml version="1.0" encoding="utf-8"?>
 <p:sldLayout xmlns:a="http://schemas.openxmlformats.org/drawingml/2006/main" xmlns:r="http://schemas.openxmlformats.org/officeDocument/2006/relationships" xmlns:p="http://schemas.openxmlformats.org/presentationml/2006/main" showMasterSp="0" type="title" preserve="1">
   <p:cSld name="Title Slide">
@@ -803,7 +889,7 @@
           <a:p>
             <a:fld id="{12E8600E-B0EE-4521-BF40-4B72FBA06775}" type="datetimeFigureOut">
               <a:rPr lang="en-IN" smtClean="0"/>
-              <a:t>17-04-2023</a:t>
+              <a:t>19-04-2023</a:t>
             </a:fld>
             <a:endParaRPr lang="en-IN"/>
           </a:p>
@@ -1892,7 +1978,7 @@
             <a:fld id="{49F3E739-D457-46E5-B626-C9B182A007EE}" type="datetimeFigureOut">
               <a:rPr lang="en-US" smtClean="0"/>
               <a:pPr/>
-              <a:t>4/17/2023</a:t>
+              <a:t>4/19/2023</a:t>
             </a:fld>
             <a:endParaRPr lang="en-US"/>
           </a:p>
@@ -2874,7 +2960,7 @@
             <a:fld id="{49F3E739-D457-46E5-B626-C9B182A007EE}" type="datetimeFigureOut">
               <a:rPr lang="en-US" smtClean="0"/>
               <a:pPr/>
-              <a:t>4/17/2023</a:t>
+              <a:t>4/19/2023</a:t>
             </a:fld>
             <a:endParaRPr lang="en-US"/>
           </a:p>
@@ -4010,7 +4096,7 @@
             <a:fld id="{49F3E739-D457-46E5-B626-C9B182A007EE}" type="datetimeFigureOut">
               <a:rPr lang="en-US" smtClean="0"/>
               <a:pPr/>
-              <a:t>4/17/2023</a:t>
+              <a:t>4/19/2023</a:t>
             </a:fld>
             <a:endParaRPr lang="en-US"/>
           </a:p>
@@ -5045,7 +5131,7 @@
             <a:fld id="{49F3E739-D457-46E5-B626-C9B182A007EE}" type="datetimeFigureOut">
               <a:rPr lang="en-US" smtClean="0"/>
               <a:pPr/>
-              <a:t>4/17/2023</a:t>
+              <a:t>4/19/2023</a:t>
             </a:fld>
             <a:endParaRPr lang="en-US"/>
           </a:p>
@@ -5707,7 +5793,7 @@
             <a:fld id="{49F3E739-D457-46E5-B626-C9B182A007EE}" type="datetimeFigureOut">
               <a:rPr lang="en-US" smtClean="0"/>
               <a:pPr/>
-              <a:t>4/17/2023</a:t>
+              <a:t>4/19/2023</a:t>
             </a:fld>
             <a:endParaRPr lang="en-US"/>
           </a:p>
@@ -6570,7 +6656,7 @@
             <a:fld id="{49F3E739-D457-46E5-B626-C9B182A007EE}" type="datetimeFigureOut">
               <a:rPr lang="en-US" smtClean="0"/>
               <a:pPr/>
-              <a:t>4/17/2023</a:t>
+              <a:t>4/19/2023</a:t>
             </a:fld>
             <a:endParaRPr lang="en-US"/>
           </a:p>
@@ -6761,7 +6847,7 @@
           <a:p>
             <a:fld id="{12E8600E-B0EE-4521-BF40-4B72FBA06775}" type="datetimeFigureOut">
               <a:rPr lang="en-IN" smtClean="0"/>
-              <a:t>17-04-2023</a:t>
+              <a:t>19-04-2023</a:t>
             </a:fld>
             <a:endParaRPr lang="en-IN"/>
           </a:p>
@@ -7733,7 +7819,7 @@
           <a:p>
             <a:fld id="{12E8600E-B0EE-4521-BF40-4B72FBA06775}" type="datetimeFigureOut">
               <a:rPr lang="en-IN" smtClean="0"/>
-              <a:t>17-04-2023</a:t>
+              <a:t>19-04-2023</a:t>
             </a:fld>
             <a:endParaRPr lang="en-IN"/>
           </a:p>
@@ -7944,7 +8030,7 @@
           <a:p>
             <a:fld id="{12E8600E-B0EE-4521-BF40-4B72FBA06775}" type="datetimeFigureOut">
               <a:rPr lang="en-IN" smtClean="0"/>
-              <a:t>17-04-2023</a:t>
+              <a:t>19-04-2023</a:t>
             </a:fld>
             <a:endParaRPr lang="en-IN"/>
           </a:p>
@@ -8978,7 +9064,7 @@
           <a:p>
             <a:fld id="{12E8600E-B0EE-4521-BF40-4B72FBA06775}" type="datetimeFigureOut">
               <a:rPr lang="en-IN" smtClean="0"/>
-              <a:t>17-04-2023</a:t>
+              <a:t>19-04-2023</a:t>
             </a:fld>
             <a:endParaRPr lang="en-IN"/>
           </a:p>
@@ -9250,7 +9336,7 @@
           <a:p>
             <a:fld id="{12E8600E-B0EE-4521-BF40-4B72FBA06775}" type="datetimeFigureOut">
               <a:rPr lang="en-IN" smtClean="0"/>
-              <a:t>17-04-2023</a:t>
+              <a:t>19-04-2023</a:t>
             </a:fld>
             <a:endParaRPr lang="en-IN"/>
           </a:p>
@@ -9661,7 +9747,7 @@
             <a:fld id="{49F3E739-D457-46E5-B626-C9B182A007EE}" type="datetimeFigureOut">
               <a:rPr lang="en-US" smtClean="0"/>
               <a:pPr/>
-              <a:t>4/17/2023</a:t>
+              <a:t>4/19/2023</a:t>
             </a:fld>
             <a:endParaRPr lang="en-US"/>
           </a:p>
@@ -9789,7 +9875,7 @@
           <a:p>
             <a:fld id="{12E8600E-B0EE-4521-BF40-4B72FBA06775}" type="datetimeFigureOut">
               <a:rPr lang="en-IN" smtClean="0"/>
-              <a:t>17-04-2023</a:t>
+              <a:t>19-04-2023</a:t>
             </a:fld>
             <a:endParaRPr lang="en-IN"/>
           </a:p>
@@ -9884,7 +9970,7 @@
           <a:p>
             <a:fld id="{12E8600E-B0EE-4521-BF40-4B72FBA06775}" type="datetimeFigureOut">
               <a:rPr lang="en-IN" smtClean="0"/>
-              <a:t>17-04-2023</a:t>
+              <a:t>19-04-2023</a:t>
             </a:fld>
             <a:endParaRPr lang="en-IN"/>
           </a:p>
@@ -10965,7 +11051,7 @@
           <a:p>
             <a:fld id="{12E8600E-B0EE-4521-BF40-4B72FBA06775}" type="datetimeFigureOut">
               <a:rPr lang="en-IN" smtClean="0"/>
-              <a:t>17-04-2023</a:t>
+              <a:t>19-04-2023</a:t>
             </a:fld>
             <a:endParaRPr lang="en-IN"/>
           </a:p>
@@ -12074,7 +12160,7 @@
             <a:fld id="{49F3E739-D457-46E5-B626-C9B182A007EE}" type="datetimeFigureOut">
               <a:rPr lang="en-US" smtClean="0"/>
               <a:pPr/>
-              <a:t>4/17/2023</a:t>
+              <a:t>4/19/2023</a:t>
             </a:fld>
             <a:endParaRPr lang="en-US"/>
           </a:p>
@@ -13073,7 +13159,7 @@
             <a:fld id="{49F3E739-D457-46E5-B626-C9B182A007EE}" type="datetimeFigureOut">
               <a:rPr lang="en-US" smtClean="0"/>
               <a:pPr/>
-              <a:t>4/17/2023</a:t>
+              <a:t>4/19/2023</a:t>
             </a:fld>
             <a:endParaRPr lang="en-US"/>
           </a:p>
@@ -14038,44 +14124,53 @@
           <a:p>
             <a:r>
               <a:rPr lang="en-US" dirty="0"/>
-              <a:t>Docker Compose - Demo</a:t>
+              <a:t>Docker Volume – </a:t>
             </a:r>
-          </a:p>
-          <a:p>
+            <a:r>
+              <a:rPr lang="en-US" dirty="0" err="1"/>
+              <a:t>tmpfs</a:t>
+            </a:r>
             <a:r>
               <a:rPr lang="en-US" dirty="0"/>
-              <a:t>Container Orchestration</a:t>
+              <a:t>, mount</a:t>
             </a:r>
           </a:p>
           <a:p>
             <a:r>
               <a:rPr lang="en-US" dirty="0"/>
-              <a:t>Docker Networking</a:t>
+              <a:t>Docker Multi Stage Build</a:t>
             </a:r>
+          </a:p>
+          <a:p>
+            <a:r>
+              <a:rPr lang="en-US"/>
+              <a:t>YAML understanding</a:t>
+            </a:r>
+            <a:endParaRPr lang="en-US" dirty="0"/>
           </a:p>
           <a:p>
             <a:r>
               <a:rPr lang="en-US" dirty="0"/>
-              <a:t>Docker Swarm Architecture</a:t>
+              <a:t>Need of Docker Compose</a:t>
             </a:r>
           </a:p>
           <a:p>
             <a:r>
               <a:rPr lang="en-US" dirty="0"/>
-              <a:t>Docker Swarm Demo</a:t>
+              <a:t>Docker Compose file – Example/Brief</a:t>
             </a:r>
           </a:p>
           <a:p>
-            <a:pPr marL="1371600" lvl="3" indent="0">
-              <a:buNone/>
-            </a:pPr>
-            <a:endParaRPr lang="en-US" dirty="0"/>
-          </a:p>
-          <a:p>
-            <a:pPr marL="0" indent="0">
-              <a:buNone/>
-            </a:pPr>
-            <a:endParaRPr lang="en-US" dirty="0"/>
+            <a:r>
+              <a:rPr lang="en-US" dirty="0"/>
+              <a:t>Docker Network</a:t>
+            </a:r>
+          </a:p>
+          <a:p>
+            <a:r>
+              <a:rPr lang="en-US" dirty="0"/>
+              <a:t>Docker compose - Demo</a:t>
+            </a:r>
           </a:p>
           <a:p>
             <a:pPr marL="457200" lvl="1" indent="0">
@@ -14113,6 +14208,204 @@
 </file>
 
 <file path=ppt/slides/slide3.xml><?xml version="1.0" encoding="utf-8"?>
+<p:sld xmlns:a="http://schemas.openxmlformats.org/drawingml/2006/main" xmlns:r="http://schemas.openxmlformats.org/officeDocument/2006/relationships" xmlns:p="http://schemas.openxmlformats.org/presentationml/2006/main">
+  <p:cSld>
+    <p:spTree>
+      <p:nvGrpSpPr>
+        <p:cNvPr id="1" name=""/>
+        <p:cNvGrpSpPr/>
+        <p:nvPr/>
+      </p:nvGrpSpPr>
+      <p:grpSpPr>
+        <a:xfrm>
+          <a:off x="0" y="0"/>
+          <a:ext cx="0" cy="0"/>
+          <a:chOff x="0" y="0"/>
+          <a:chExt cx="0" cy="0"/>
+        </a:xfrm>
+      </p:grpSpPr>
+      <p:sp>
+        <p:nvSpPr>
+          <p:cNvPr id="2" name="Title 1">
+            <a:extLst>
+              <a:ext uri="{FF2B5EF4-FFF2-40B4-BE49-F238E27FC236}">
+                <a16:creationId xmlns:a16="http://schemas.microsoft.com/office/drawing/2014/main" id="{24A6AF66-C42C-48F3-42E2-7027B1C063DF}"/>
+              </a:ext>
+            </a:extLst>
+          </p:cNvPr>
+          <p:cNvSpPr>
+            <a:spLocks noGrp="1"/>
+          </p:cNvSpPr>
+          <p:nvPr>
+            <p:ph type="title"/>
+          </p:nvPr>
+        </p:nvSpPr>
+        <p:spPr/>
+        <p:txBody>
+          <a:bodyPr/>
+          <a:lstStyle/>
+          <a:p>
+            <a:r>
+              <a:rPr lang="en-US" dirty="0" err="1"/>
+              <a:t>Tmpfs</a:t>
+            </a:r>
+            <a:r>
+              <a:rPr lang="en-US" dirty="0"/>
+              <a:t> mounts</a:t>
+            </a:r>
+            <a:endParaRPr lang="en-IN" dirty="0"/>
+          </a:p>
+        </p:txBody>
+      </p:sp>
+      <p:sp>
+        <p:nvSpPr>
+          <p:cNvPr id="3" name="Content Placeholder 2">
+            <a:extLst>
+              <a:ext uri="{FF2B5EF4-FFF2-40B4-BE49-F238E27FC236}">
+                <a16:creationId xmlns:a16="http://schemas.microsoft.com/office/drawing/2014/main" id="{318A64CB-0D85-BBDD-E6CF-647A5C842CF2}"/>
+              </a:ext>
+            </a:extLst>
+          </p:cNvPr>
+          <p:cNvSpPr>
+            <a:spLocks noGrp="1"/>
+          </p:cNvSpPr>
+          <p:nvPr>
+            <p:ph idx="1"/>
+          </p:nvPr>
+        </p:nvSpPr>
+        <p:spPr>
+          <a:xfrm>
+            <a:off x="1154955" y="2603500"/>
+            <a:ext cx="5442794" cy="3416300"/>
+          </a:xfrm>
+        </p:spPr>
+        <p:txBody>
+          <a:bodyPr/>
+          <a:lstStyle/>
+          <a:p>
+            <a:r>
+              <a:rPr lang="en-US" dirty="0" err="1"/>
+              <a:t>Tmpfs</a:t>
+            </a:r>
+            <a:r>
+              <a:rPr lang="en-US" dirty="0"/>
+              <a:t> nature – not persistent data</a:t>
+            </a:r>
+          </a:p>
+          <a:p>
+            <a:r>
+              <a:rPr lang="en-US" dirty="0"/>
+              <a:t>Useful to store sensitive files</a:t>
+            </a:r>
+          </a:p>
+          <a:p>
+            <a:r>
+              <a:rPr lang="en-US" dirty="0"/>
+              <a:t>Remove with container lifecycle</a:t>
+            </a:r>
+          </a:p>
+          <a:p>
+            <a:r>
+              <a:rPr lang="en-IN" dirty="0"/>
+              <a:t>Not able to share b/w containers</a:t>
+            </a:r>
+          </a:p>
+          <a:p>
+            <a:r>
+              <a:rPr lang="en-IN" dirty="0"/>
+              <a:t>Only available for Docker running on Linux</a:t>
+            </a:r>
+          </a:p>
+          <a:p>
+            <a:r>
+              <a:rPr lang="en-US" i="1" dirty="0"/>
+              <a:t>docker run -d -it --name </a:t>
+            </a:r>
+            <a:r>
+              <a:rPr lang="en-US" i="1" dirty="0" err="1"/>
+              <a:t>tmptest</a:t>
+            </a:r>
+            <a:r>
+              <a:rPr lang="en-US" i="1" dirty="0"/>
+              <a:t> --</a:t>
+            </a:r>
+            <a:r>
+              <a:rPr lang="en-US" i="1" dirty="0" err="1"/>
+              <a:t>tmpfs</a:t>
+            </a:r>
+            <a:r>
+              <a:rPr lang="en-US" i="1" dirty="0"/>
+              <a:t> /app </a:t>
+            </a:r>
+            <a:r>
+              <a:rPr lang="en-US" i="1" dirty="0" err="1"/>
+              <a:t>nginx:latest</a:t>
+            </a:r>
+            <a:endParaRPr lang="en-IN" i="1" dirty="0"/>
+          </a:p>
+        </p:txBody>
+      </p:sp>
+      <p:pic>
+        <p:nvPicPr>
+          <p:cNvPr id="1026" name="Picture 2" descr="tmpfs on the Docker host">
+            <a:extLst>
+              <a:ext uri="{FF2B5EF4-FFF2-40B4-BE49-F238E27FC236}">
+                <a16:creationId xmlns:a16="http://schemas.microsoft.com/office/drawing/2014/main" id="{3F8BCC1A-3805-B75A-3706-0FA4C6FC8089}"/>
+              </a:ext>
+            </a:extLst>
+          </p:cNvPr>
+          <p:cNvPicPr>
+            <a:picLocks noChangeAspect="1" noChangeArrowheads="1"/>
+          </p:cNvPicPr>
+          <p:nvPr/>
+        </p:nvPicPr>
+        <p:blipFill>
+          <a:blip r:embed="rId2">
+            <a:extLst>
+              <a:ext uri="{28A0092B-C50C-407E-A947-70E740481C1C}">
+                <a14:useLocalDpi xmlns:a14="http://schemas.microsoft.com/office/drawing/2010/main" val="0"/>
+              </a:ext>
+            </a:extLst>
+          </a:blip>
+          <a:srcRect/>
+          <a:stretch>
+            <a:fillRect/>
+          </a:stretch>
+        </p:blipFill>
+        <p:spPr bwMode="auto">
+          <a:xfrm>
+            <a:off x="7019778" y="2505002"/>
+            <a:ext cx="4923693" cy="3416300"/>
+          </a:xfrm>
+          <a:prstGeom prst="rect">
+            <a:avLst/>
+          </a:prstGeom>
+          <a:noFill/>
+          <a:extLst>
+            <a:ext uri="{909E8E84-426E-40DD-AFC4-6F175D3DCCD1}">
+              <a14:hiddenFill xmlns:a14="http://schemas.microsoft.com/office/drawing/2010/main">
+                <a:solidFill>
+                  <a:srgbClr val="FFFFFF"/>
+                </a:solidFill>
+              </a14:hiddenFill>
+            </a:ext>
+          </a:extLst>
+        </p:spPr>
+      </p:pic>
+    </p:spTree>
+    <p:extLst>
+      <p:ext uri="{BB962C8B-B14F-4D97-AF65-F5344CB8AC3E}">
+        <p14:creationId xmlns:p14="http://schemas.microsoft.com/office/powerpoint/2010/main" val="3956562462"/>
+      </p:ext>
+    </p:extLst>
+  </p:cSld>
+  <p:clrMapOvr>
+    <a:masterClrMapping/>
+  </p:clrMapOvr>
+</p:sld>
+</file>
+
+<file path=ppt/slides/slide4.xml><?xml version="1.0" encoding="utf-8"?>
 <p:sld xmlns:a="http://schemas.openxmlformats.org/drawingml/2006/main" xmlns:r="http://schemas.openxmlformats.org/officeDocument/2006/relationships" xmlns:p="http://schemas.openxmlformats.org/presentationml/2006/main">
   <p:cSld>
     <p:spTree>
@@ -14159,7 +14452,7 @@
           <a:p>
             <a:r>
               <a:rPr lang="en-US" sz="2800" dirty="0"/>
-              <a:t>CONTAINER ORCHESTRATION – DOCKER SWARM</a:t>
+              <a:t>DOCKER COMPOSE – NEED OF ORCHESTRATION</a:t>
             </a:r>
             <a:endParaRPr lang="en-IN" sz="2800" dirty="0"/>
           </a:p>
@@ -14183,39 +14476,21 @@
         </p:nvSpPr>
         <p:spPr>
           <a:xfrm>
-            <a:off x="1154955" y="2603500"/>
-            <a:ext cx="4795271" cy="3416300"/>
+            <a:off x="132524" y="2222776"/>
+            <a:ext cx="10429460" cy="706964"/>
           </a:xfrm>
         </p:spPr>
         <p:txBody>
           <a:bodyPr>
-            <a:normAutofit/>
+            <a:noAutofit/>
           </a:bodyPr>
           <a:lstStyle/>
           <a:p>
             <a:r>
-              <a:rPr lang="en-US" sz="2400" dirty="0"/>
-              <a:t>Native Clustering System</a:t>
+              <a:rPr lang="en-US" sz="1400" dirty="0"/>
+              <a:t>Problems with standalone Docker Running a server cluster on a set of Docker containers, on a single Docker host is vulnerable to single point of failure !!!</a:t>
             </a:r>
-          </a:p>
-          <a:p>
-            <a:r>
-              <a:rPr lang="en-US" sz="2400" dirty="0"/>
-              <a:t>Clustering (management) for Docker</a:t>
-            </a:r>
-          </a:p>
-          <a:p>
-            <a:r>
-              <a:rPr lang="en-US" sz="2400" dirty="0"/>
-              <a:t>Manage multiple Docker daemons</a:t>
-            </a:r>
-          </a:p>
-          <a:p>
-            <a:r>
-              <a:rPr lang="en-US" sz="2400" dirty="0"/>
-              <a:t>Distribute workloads</a:t>
-            </a:r>
-            <a:endParaRPr lang="en-IN" sz="2400" dirty="0"/>
+            <a:endParaRPr lang="en-IN" sz="1400" dirty="0"/>
           </a:p>
         </p:txBody>
       </p:sp>
@@ -14224,7 +14499,7 @@
           <p:cNvPr id="4" name="Picture 3">
             <a:extLst>
               <a:ext uri="{FF2B5EF4-FFF2-40B4-BE49-F238E27FC236}">
-                <a16:creationId xmlns:a16="http://schemas.microsoft.com/office/drawing/2014/main" id="{801C5B4C-075E-C636-3249-8D1884ADA1C4}"/>
+                <a16:creationId xmlns:a16="http://schemas.microsoft.com/office/drawing/2014/main" id="{883D2B19-66CF-4EB1-E5A5-4343F6B98C0F}"/>
               </a:ext>
             </a:extLst>
           </p:cNvPr>
@@ -14247,8 +14522,80 @@
         </p:blipFill>
         <p:spPr>
           <a:xfrm>
-            <a:off x="5719320" y="1950217"/>
-            <a:ext cx="6186912" cy="4722866"/>
+            <a:off x="410817" y="3111682"/>
+            <a:ext cx="5486400" cy="3633675"/>
+          </a:xfrm>
+          <a:prstGeom prst="rect">
+            <a:avLst/>
+          </a:prstGeom>
+        </p:spPr>
+      </p:pic>
+      <p:pic>
+        <p:nvPicPr>
+          <p:cNvPr id="5" name="Picture 4">
+            <a:extLst>
+              <a:ext uri="{FF2B5EF4-FFF2-40B4-BE49-F238E27FC236}">
+                <a16:creationId xmlns:a16="http://schemas.microsoft.com/office/drawing/2014/main" id="{A4C80C9E-D7FA-95D1-6CCF-318749D2CF54}"/>
+              </a:ext>
+            </a:extLst>
+          </p:cNvPr>
+          <p:cNvPicPr>
+            <a:picLocks noChangeAspect="1"/>
+          </p:cNvPicPr>
+          <p:nvPr/>
+        </p:nvPicPr>
+        <p:blipFill>
+          <a:blip r:embed="rId3">
+            <a:extLst>
+              <a:ext uri="{28A0092B-C50C-407E-A947-70E740481C1C}">
+                <a14:useLocalDpi xmlns:a14="http://schemas.microsoft.com/office/drawing/2010/main" val="0"/>
+              </a:ext>
+            </a:extLst>
+          </a:blip>
+          <a:stretch>
+            <a:fillRect/>
+          </a:stretch>
+        </p:blipFill>
+        <p:spPr>
+          <a:xfrm>
+            <a:off x="6096000" y="3111682"/>
+            <a:ext cx="5963477" cy="3623589"/>
+          </a:xfrm>
+          <a:prstGeom prst="rect">
+            <a:avLst/>
+          </a:prstGeom>
+        </p:spPr>
+      </p:pic>
+      <p:pic>
+        <p:nvPicPr>
+          <p:cNvPr id="6" name="Picture 5">
+            <a:extLst>
+              <a:ext uri="{FF2B5EF4-FFF2-40B4-BE49-F238E27FC236}">
+                <a16:creationId xmlns:a16="http://schemas.microsoft.com/office/drawing/2014/main" id="{97CF575D-AAD9-658A-4EA8-443237AB3ED2}"/>
+              </a:ext>
+            </a:extLst>
+          </p:cNvPr>
+          <p:cNvPicPr>
+            <a:picLocks noChangeAspect="1"/>
+          </p:cNvPicPr>
+          <p:nvPr/>
+        </p:nvPicPr>
+        <p:blipFill>
+          <a:blip r:embed="rId4">
+            <a:extLst>
+              <a:ext uri="{28A0092B-C50C-407E-A947-70E740481C1C}">
+                <a14:useLocalDpi xmlns:a14="http://schemas.microsoft.com/office/drawing/2010/main" val="0"/>
+              </a:ext>
+            </a:extLst>
+          </a:blip>
+          <a:stretch>
+            <a:fillRect/>
+          </a:stretch>
+        </p:blipFill>
+        <p:spPr>
+          <a:xfrm>
+            <a:off x="10442712" y="1881809"/>
+            <a:ext cx="1749287" cy="1229873"/>
           </a:xfrm>
           <a:prstGeom prst="rect">
             <a:avLst/>
@@ -14258,7 +14605,752 @@
     </p:spTree>
     <p:extLst>
       <p:ext uri="{BB962C8B-B14F-4D97-AF65-F5344CB8AC3E}">
-        <p14:creationId xmlns:p14="http://schemas.microsoft.com/office/powerpoint/2010/main" val="3666468436"/>
+        <p14:creationId xmlns:p14="http://schemas.microsoft.com/office/powerpoint/2010/main" val="3389861919"/>
+      </p:ext>
+    </p:extLst>
+  </p:cSld>
+  <p:clrMapOvr>
+    <a:masterClrMapping/>
+  </p:clrMapOvr>
+  <p:timing>
+    <p:tnLst>
+      <p:par>
+        <p:cTn id="1" dur="indefinite" restart="never" nodeType="tmRoot">
+          <p:childTnLst>
+            <p:seq concurrent="1" nextAc="seek">
+              <p:cTn id="2" dur="indefinite" nodeType="mainSeq">
+                <p:childTnLst>
+                  <p:par>
+                    <p:cTn id="3" fill="hold">
+                      <p:stCondLst>
+                        <p:cond delay="indefinite"/>
+                      </p:stCondLst>
+                      <p:childTnLst>
+                        <p:par>
+                          <p:cTn id="4" fill="hold">
+                            <p:stCondLst>
+                              <p:cond delay="0"/>
+                            </p:stCondLst>
+                            <p:childTnLst>
+                              <p:par>
+                                <p:cTn id="5" presetID="2" presetClass="entr" presetSubtype="4" fill="hold" grpId="0" nodeType="clickEffect">
+                                  <p:stCondLst>
+                                    <p:cond delay="0"/>
+                                  </p:stCondLst>
+                                  <p:childTnLst>
+                                    <p:set>
+                                      <p:cBhvr>
+                                        <p:cTn id="6" dur="1" fill="hold">
+                                          <p:stCondLst>
+                                            <p:cond delay="0"/>
+                                          </p:stCondLst>
+                                        </p:cTn>
+                                        <p:tgtEl>
+                                          <p:spTgt spid="2"/>
+                                        </p:tgtEl>
+                                        <p:attrNameLst>
+                                          <p:attrName>style.visibility</p:attrName>
+                                        </p:attrNameLst>
+                                      </p:cBhvr>
+                                      <p:to>
+                                        <p:strVal val="visible"/>
+                                      </p:to>
+                                    </p:set>
+                                    <p:anim calcmode="lin" valueType="num">
+                                      <p:cBhvr additive="base">
+                                        <p:cTn id="7" dur="500" fill="hold"/>
+                                        <p:tgtEl>
+                                          <p:spTgt spid="2"/>
+                                        </p:tgtEl>
+                                        <p:attrNameLst>
+                                          <p:attrName>ppt_x</p:attrName>
+                                        </p:attrNameLst>
+                                      </p:cBhvr>
+                                      <p:tavLst>
+                                        <p:tav tm="0">
+                                          <p:val>
+                                            <p:strVal val="#ppt_x"/>
+                                          </p:val>
+                                        </p:tav>
+                                        <p:tav tm="100000">
+                                          <p:val>
+                                            <p:strVal val="#ppt_x"/>
+                                          </p:val>
+                                        </p:tav>
+                                      </p:tavLst>
+                                    </p:anim>
+                                    <p:anim calcmode="lin" valueType="num">
+                                      <p:cBhvr additive="base">
+                                        <p:cTn id="8" dur="500" fill="hold"/>
+                                        <p:tgtEl>
+                                          <p:spTgt spid="2"/>
+                                        </p:tgtEl>
+                                        <p:attrNameLst>
+                                          <p:attrName>ppt_y</p:attrName>
+                                        </p:attrNameLst>
+                                      </p:cBhvr>
+                                      <p:tavLst>
+                                        <p:tav tm="0">
+                                          <p:val>
+                                            <p:strVal val="1+#ppt_h/2"/>
+                                          </p:val>
+                                        </p:tav>
+                                        <p:tav tm="100000">
+                                          <p:val>
+                                            <p:strVal val="#ppt_y"/>
+                                          </p:val>
+                                        </p:tav>
+                                      </p:tavLst>
+                                    </p:anim>
+                                  </p:childTnLst>
+                                </p:cTn>
+                              </p:par>
+                            </p:childTnLst>
+                          </p:cTn>
+                        </p:par>
+                      </p:childTnLst>
+                    </p:cTn>
+                  </p:par>
+                  <p:par>
+                    <p:cTn id="9" fill="hold">
+                      <p:stCondLst>
+                        <p:cond delay="indefinite"/>
+                      </p:stCondLst>
+                      <p:childTnLst>
+                        <p:par>
+                          <p:cTn id="10" fill="hold">
+                            <p:stCondLst>
+                              <p:cond delay="0"/>
+                            </p:stCondLst>
+                            <p:childTnLst>
+                              <p:par>
+                                <p:cTn id="11" presetID="42" presetClass="entr" presetSubtype="0" fill="hold" grpId="0" nodeType="clickEffect">
+                                  <p:stCondLst>
+                                    <p:cond delay="0"/>
+                                  </p:stCondLst>
+                                  <p:childTnLst>
+                                    <p:set>
+                                      <p:cBhvr>
+                                        <p:cTn id="12" dur="1" fill="hold">
+                                          <p:stCondLst>
+                                            <p:cond delay="0"/>
+                                          </p:stCondLst>
+                                        </p:cTn>
+                                        <p:tgtEl>
+                                          <p:spTgt spid="3">
+                                            <p:txEl>
+                                              <p:pRg st="0" end="0"/>
+                                            </p:txEl>
+                                          </p:spTgt>
+                                        </p:tgtEl>
+                                        <p:attrNameLst>
+                                          <p:attrName>style.visibility</p:attrName>
+                                        </p:attrNameLst>
+                                      </p:cBhvr>
+                                      <p:to>
+                                        <p:strVal val="visible"/>
+                                      </p:to>
+                                    </p:set>
+                                    <p:animEffect transition="in" filter="fade">
+                                      <p:cBhvr>
+                                        <p:cTn id="13" dur="1000"/>
+                                        <p:tgtEl>
+                                          <p:spTgt spid="3">
+                                            <p:txEl>
+                                              <p:pRg st="0" end="0"/>
+                                            </p:txEl>
+                                          </p:spTgt>
+                                        </p:tgtEl>
+                                      </p:cBhvr>
+                                    </p:animEffect>
+                                    <p:anim calcmode="lin" valueType="num">
+                                      <p:cBhvr>
+                                        <p:cTn id="14" dur="1000" fill="hold"/>
+                                        <p:tgtEl>
+                                          <p:spTgt spid="3">
+                                            <p:txEl>
+                                              <p:pRg st="0" end="0"/>
+                                            </p:txEl>
+                                          </p:spTgt>
+                                        </p:tgtEl>
+                                        <p:attrNameLst>
+                                          <p:attrName>ppt_x</p:attrName>
+                                        </p:attrNameLst>
+                                      </p:cBhvr>
+                                      <p:tavLst>
+                                        <p:tav tm="0">
+                                          <p:val>
+                                            <p:strVal val="#ppt_x"/>
+                                          </p:val>
+                                        </p:tav>
+                                        <p:tav tm="100000">
+                                          <p:val>
+                                            <p:strVal val="#ppt_x"/>
+                                          </p:val>
+                                        </p:tav>
+                                      </p:tavLst>
+                                    </p:anim>
+                                    <p:anim calcmode="lin" valueType="num">
+                                      <p:cBhvr>
+                                        <p:cTn id="15" dur="1000" fill="hold"/>
+                                        <p:tgtEl>
+                                          <p:spTgt spid="3">
+                                            <p:txEl>
+                                              <p:pRg st="0" end="0"/>
+                                            </p:txEl>
+                                          </p:spTgt>
+                                        </p:tgtEl>
+                                        <p:attrNameLst>
+                                          <p:attrName>ppt_y</p:attrName>
+                                        </p:attrNameLst>
+                                      </p:cBhvr>
+                                      <p:tavLst>
+                                        <p:tav tm="0">
+                                          <p:val>
+                                            <p:strVal val="#ppt_y+.1"/>
+                                          </p:val>
+                                        </p:tav>
+                                        <p:tav tm="100000">
+                                          <p:val>
+                                            <p:strVal val="#ppt_y"/>
+                                          </p:val>
+                                        </p:tav>
+                                      </p:tavLst>
+                                    </p:anim>
+                                  </p:childTnLst>
+                                </p:cTn>
+                              </p:par>
+                            </p:childTnLst>
+                          </p:cTn>
+                        </p:par>
+                      </p:childTnLst>
+                    </p:cTn>
+                  </p:par>
+                  <p:par>
+                    <p:cTn id="16" fill="hold">
+                      <p:stCondLst>
+                        <p:cond delay="indefinite"/>
+                      </p:stCondLst>
+                      <p:childTnLst>
+                        <p:par>
+                          <p:cTn id="17" fill="hold">
+                            <p:stCondLst>
+                              <p:cond delay="0"/>
+                            </p:stCondLst>
+                            <p:childTnLst>
+                              <p:par>
+                                <p:cTn id="18" presetID="42" presetClass="entr" presetSubtype="0" fill="hold" nodeType="clickEffect">
+                                  <p:stCondLst>
+                                    <p:cond delay="0"/>
+                                  </p:stCondLst>
+                                  <p:childTnLst>
+                                    <p:set>
+                                      <p:cBhvr>
+                                        <p:cTn id="19" dur="1" fill="hold">
+                                          <p:stCondLst>
+                                            <p:cond delay="0"/>
+                                          </p:stCondLst>
+                                        </p:cTn>
+                                        <p:tgtEl>
+                                          <p:spTgt spid="6"/>
+                                        </p:tgtEl>
+                                        <p:attrNameLst>
+                                          <p:attrName>style.visibility</p:attrName>
+                                        </p:attrNameLst>
+                                      </p:cBhvr>
+                                      <p:to>
+                                        <p:strVal val="visible"/>
+                                      </p:to>
+                                    </p:set>
+                                    <p:animEffect transition="in" filter="fade">
+                                      <p:cBhvr>
+                                        <p:cTn id="20" dur="1000"/>
+                                        <p:tgtEl>
+                                          <p:spTgt spid="6"/>
+                                        </p:tgtEl>
+                                      </p:cBhvr>
+                                    </p:animEffect>
+                                    <p:anim calcmode="lin" valueType="num">
+                                      <p:cBhvr>
+                                        <p:cTn id="21" dur="1000" fill="hold"/>
+                                        <p:tgtEl>
+                                          <p:spTgt spid="6"/>
+                                        </p:tgtEl>
+                                        <p:attrNameLst>
+                                          <p:attrName>ppt_x</p:attrName>
+                                        </p:attrNameLst>
+                                      </p:cBhvr>
+                                      <p:tavLst>
+                                        <p:tav tm="0">
+                                          <p:val>
+                                            <p:strVal val="#ppt_x"/>
+                                          </p:val>
+                                        </p:tav>
+                                        <p:tav tm="100000">
+                                          <p:val>
+                                            <p:strVal val="#ppt_x"/>
+                                          </p:val>
+                                        </p:tav>
+                                      </p:tavLst>
+                                    </p:anim>
+                                    <p:anim calcmode="lin" valueType="num">
+                                      <p:cBhvr>
+                                        <p:cTn id="22" dur="1000" fill="hold"/>
+                                        <p:tgtEl>
+                                          <p:spTgt spid="6"/>
+                                        </p:tgtEl>
+                                        <p:attrNameLst>
+                                          <p:attrName>ppt_y</p:attrName>
+                                        </p:attrNameLst>
+                                      </p:cBhvr>
+                                      <p:tavLst>
+                                        <p:tav tm="0">
+                                          <p:val>
+                                            <p:strVal val="#ppt_y+.1"/>
+                                          </p:val>
+                                        </p:tav>
+                                        <p:tav tm="100000">
+                                          <p:val>
+                                            <p:strVal val="#ppt_y"/>
+                                          </p:val>
+                                        </p:tav>
+                                      </p:tavLst>
+                                    </p:anim>
+                                  </p:childTnLst>
+                                </p:cTn>
+                              </p:par>
+                            </p:childTnLst>
+                          </p:cTn>
+                        </p:par>
+                      </p:childTnLst>
+                    </p:cTn>
+                  </p:par>
+                  <p:par>
+                    <p:cTn id="23" fill="hold">
+                      <p:stCondLst>
+                        <p:cond delay="indefinite"/>
+                      </p:stCondLst>
+                      <p:childTnLst>
+                        <p:par>
+                          <p:cTn id="24" fill="hold">
+                            <p:stCondLst>
+                              <p:cond delay="0"/>
+                            </p:stCondLst>
+                            <p:childTnLst>
+                              <p:par>
+                                <p:cTn id="25" presetID="42" presetClass="entr" presetSubtype="0" fill="hold" nodeType="clickEffect">
+                                  <p:stCondLst>
+                                    <p:cond delay="0"/>
+                                  </p:stCondLst>
+                                  <p:childTnLst>
+                                    <p:set>
+                                      <p:cBhvr>
+                                        <p:cTn id="26" dur="1" fill="hold">
+                                          <p:stCondLst>
+                                            <p:cond delay="0"/>
+                                          </p:stCondLst>
+                                        </p:cTn>
+                                        <p:tgtEl>
+                                          <p:spTgt spid="4"/>
+                                        </p:tgtEl>
+                                        <p:attrNameLst>
+                                          <p:attrName>style.visibility</p:attrName>
+                                        </p:attrNameLst>
+                                      </p:cBhvr>
+                                      <p:to>
+                                        <p:strVal val="visible"/>
+                                      </p:to>
+                                    </p:set>
+                                    <p:animEffect transition="in" filter="fade">
+                                      <p:cBhvr>
+                                        <p:cTn id="27" dur="1000"/>
+                                        <p:tgtEl>
+                                          <p:spTgt spid="4"/>
+                                        </p:tgtEl>
+                                      </p:cBhvr>
+                                    </p:animEffect>
+                                    <p:anim calcmode="lin" valueType="num">
+                                      <p:cBhvr>
+                                        <p:cTn id="28" dur="1000" fill="hold"/>
+                                        <p:tgtEl>
+                                          <p:spTgt spid="4"/>
+                                        </p:tgtEl>
+                                        <p:attrNameLst>
+                                          <p:attrName>ppt_x</p:attrName>
+                                        </p:attrNameLst>
+                                      </p:cBhvr>
+                                      <p:tavLst>
+                                        <p:tav tm="0">
+                                          <p:val>
+                                            <p:strVal val="#ppt_x"/>
+                                          </p:val>
+                                        </p:tav>
+                                        <p:tav tm="100000">
+                                          <p:val>
+                                            <p:strVal val="#ppt_x"/>
+                                          </p:val>
+                                        </p:tav>
+                                      </p:tavLst>
+                                    </p:anim>
+                                    <p:anim calcmode="lin" valueType="num">
+                                      <p:cBhvr>
+                                        <p:cTn id="29" dur="1000" fill="hold"/>
+                                        <p:tgtEl>
+                                          <p:spTgt spid="4"/>
+                                        </p:tgtEl>
+                                        <p:attrNameLst>
+                                          <p:attrName>ppt_y</p:attrName>
+                                        </p:attrNameLst>
+                                      </p:cBhvr>
+                                      <p:tavLst>
+                                        <p:tav tm="0">
+                                          <p:val>
+                                            <p:strVal val="#ppt_y+.1"/>
+                                          </p:val>
+                                        </p:tav>
+                                        <p:tav tm="100000">
+                                          <p:val>
+                                            <p:strVal val="#ppt_y"/>
+                                          </p:val>
+                                        </p:tav>
+                                      </p:tavLst>
+                                    </p:anim>
+                                  </p:childTnLst>
+                                </p:cTn>
+                              </p:par>
+                            </p:childTnLst>
+                          </p:cTn>
+                        </p:par>
+                      </p:childTnLst>
+                    </p:cTn>
+                  </p:par>
+                  <p:par>
+                    <p:cTn id="30" fill="hold">
+                      <p:stCondLst>
+                        <p:cond delay="indefinite"/>
+                      </p:stCondLst>
+                      <p:childTnLst>
+                        <p:par>
+                          <p:cTn id="31" fill="hold">
+                            <p:stCondLst>
+                              <p:cond delay="0"/>
+                            </p:stCondLst>
+                            <p:childTnLst>
+                              <p:par>
+                                <p:cTn id="32" presetID="42" presetClass="entr" presetSubtype="0" fill="hold" nodeType="clickEffect">
+                                  <p:stCondLst>
+                                    <p:cond delay="0"/>
+                                  </p:stCondLst>
+                                  <p:childTnLst>
+                                    <p:set>
+                                      <p:cBhvr>
+                                        <p:cTn id="33" dur="1" fill="hold">
+                                          <p:stCondLst>
+                                            <p:cond delay="0"/>
+                                          </p:stCondLst>
+                                        </p:cTn>
+                                        <p:tgtEl>
+                                          <p:spTgt spid="5"/>
+                                        </p:tgtEl>
+                                        <p:attrNameLst>
+                                          <p:attrName>style.visibility</p:attrName>
+                                        </p:attrNameLst>
+                                      </p:cBhvr>
+                                      <p:to>
+                                        <p:strVal val="visible"/>
+                                      </p:to>
+                                    </p:set>
+                                    <p:animEffect transition="in" filter="fade">
+                                      <p:cBhvr>
+                                        <p:cTn id="34" dur="1000"/>
+                                        <p:tgtEl>
+                                          <p:spTgt spid="5"/>
+                                        </p:tgtEl>
+                                      </p:cBhvr>
+                                    </p:animEffect>
+                                    <p:anim calcmode="lin" valueType="num">
+                                      <p:cBhvr>
+                                        <p:cTn id="35" dur="1000" fill="hold"/>
+                                        <p:tgtEl>
+                                          <p:spTgt spid="5"/>
+                                        </p:tgtEl>
+                                        <p:attrNameLst>
+                                          <p:attrName>ppt_x</p:attrName>
+                                        </p:attrNameLst>
+                                      </p:cBhvr>
+                                      <p:tavLst>
+                                        <p:tav tm="0">
+                                          <p:val>
+                                            <p:strVal val="#ppt_x"/>
+                                          </p:val>
+                                        </p:tav>
+                                        <p:tav tm="100000">
+                                          <p:val>
+                                            <p:strVal val="#ppt_x"/>
+                                          </p:val>
+                                        </p:tav>
+                                      </p:tavLst>
+                                    </p:anim>
+                                    <p:anim calcmode="lin" valueType="num">
+                                      <p:cBhvr>
+                                        <p:cTn id="36" dur="1000" fill="hold"/>
+                                        <p:tgtEl>
+                                          <p:spTgt spid="5"/>
+                                        </p:tgtEl>
+                                        <p:attrNameLst>
+                                          <p:attrName>ppt_y</p:attrName>
+                                        </p:attrNameLst>
+                                      </p:cBhvr>
+                                      <p:tavLst>
+                                        <p:tav tm="0">
+                                          <p:val>
+                                            <p:strVal val="#ppt_y+.1"/>
+                                          </p:val>
+                                        </p:tav>
+                                        <p:tav tm="100000">
+                                          <p:val>
+                                            <p:strVal val="#ppt_y"/>
+                                          </p:val>
+                                        </p:tav>
+                                      </p:tavLst>
+                                    </p:anim>
+                                  </p:childTnLst>
+                                </p:cTn>
+                              </p:par>
+                            </p:childTnLst>
+                          </p:cTn>
+                        </p:par>
+                      </p:childTnLst>
+                    </p:cTn>
+                  </p:par>
+                </p:childTnLst>
+              </p:cTn>
+              <p:prevCondLst>
+                <p:cond evt="onPrev" delay="0">
+                  <p:tgtEl>
+                    <p:sldTgt/>
+                  </p:tgtEl>
+                </p:cond>
+              </p:prevCondLst>
+              <p:nextCondLst>
+                <p:cond evt="onNext" delay="0">
+                  <p:tgtEl>
+                    <p:sldTgt/>
+                  </p:tgtEl>
+                </p:cond>
+              </p:nextCondLst>
+            </p:seq>
+          </p:childTnLst>
+        </p:cTn>
+      </p:par>
+    </p:tnLst>
+    <p:bldLst>
+      <p:bldP spid="2" grpId="0"/>
+      <p:bldP spid="3" grpId="0" build="p"/>
+    </p:bldLst>
+  </p:timing>
+</p:sld>
+</file>
+
+<file path=ppt/slides/slide5.xml><?xml version="1.0" encoding="utf-8"?>
+<p:sld xmlns:a="http://schemas.openxmlformats.org/drawingml/2006/main" xmlns:r="http://schemas.openxmlformats.org/officeDocument/2006/relationships" xmlns:p="http://schemas.openxmlformats.org/presentationml/2006/main">
+  <p:cSld>
+    <p:spTree>
+      <p:nvGrpSpPr>
+        <p:cNvPr id="1" name=""/>
+        <p:cNvGrpSpPr/>
+        <p:nvPr/>
+      </p:nvGrpSpPr>
+      <p:grpSpPr>
+        <a:xfrm>
+          <a:off x="0" y="0"/>
+          <a:ext cx="0" cy="0"/>
+          <a:chOff x="0" y="0"/>
+          <a:chExt cx="0" cy="0"/>
+        </a:xfrm>
+      </p:grpSpPr>
+      <p:sp>
+        <p:nvSpPr>
+          <p:cNvPr id="2" name="Title 1">
+            <a:extLst>
+              <a:ext uri="{FF2B5EF4-FFF2-40B4-BE49-F238E27FC236}">
+                <a16:creationId xmlns:a16="http://schemas.microsoft.com/office/drawing/2014/main" id="{97BC34CC-2191-086A-75CD-07624340C7B3}"/>
+              </a:ext>
+            </a:extLst>
+          </p:cNvPr>
+          <p:cNvSpPr>
+            <a:spLocks noGrp="1"/>
+          </p:cNvSpPr>
+          <p:nvPr>
+            <p:ph type="title"/>
+          </p:nvPr>
+        </p:nvSpPr>
+        <p:spPr>
+          <a:xfrm>
+            <a:off x="1154953" y="973668"/>
+            <a:ext cx="9128734" cy="706964"/>
+          </a:xfrm>
+        </p:spPr>
+        <p:txBody>
+          <a:bodyPr>
+            <a:normAutofit/>
+          </a:bodyPr>
+          <a:lstStyle/>
+          <a:p>
+            <a:r>
+              <a:rPr lang="en-US" dirty="0"/>
+              <a:t>DOCKER COMPOSE</a:t>
+            </a:r>
+            <a:endParaRPr lang="en-IN" dirty="0"/>
+          </a:p>
+        </p:txBody>
+      </p:sp>
+      <p:sp>
+        <p:nvSpPr>
+          <p:cNvPr id="3" name="Content Placeholder 2">
+            <a:extLst>
+              <a:ext uri="{FF2B5EF4-FFF2-40B4-BE49-F238E27FC236}">
+                <a16:creationId xmlns:a16="http://schemas.microsoft.com/office/drawing/2014/main" id="{5188517A-DD37-A765-9F25-8A87477F3848}"/>
+              </a:ext>
+            </a:extLst>
+          </p:cNvPr>
+          <p:cNvSpPr>
+            <a:spLocks noGrp="1"/>
+          </p:cNvSpPr>
+          <p:nvPr>
+            <p:ph idx="1"/>
+          </p:nvPr>
+        </p:nvSpPr>
+        <p:spPr>
+          <a:xfrm>
+            <a:off x="404336" y="2179431"/>
+            <a:ext cx="8761412" cy="3416300"/>
+          </a:xfrm>
+        </p:spPr>
+        <p:txBody>
+          <a:bodyPr/>
+          <a:lstStyle/>
+          <a:p>
+            <a:r>
+              <a:rPr lang="en-US" sz="1400" dirty="0">
+                <a:solidFill>
+                  <a:srgbClr val="31859C"/>
+                </a:solidFill>
+              </a:rPr>
+              <a:t>Tool for defining and running multi-container</a:t>
+            </a:r>
+          </a:p>
+          <a:p>
+            <a:r>
+              <a:rPr lang="en-US" sz="1400" dirty="0">
+                <a:solidFill>
+                  <a:srgbClr val="31859C"/>
+                </a:solidFill>
+              </a:rPr>
+              <a:t>applications with Docker in a single file</a:t>
+            </a:r>
+          </a:p>
+          <a:p>
+            <a:r>
+              <a:rPr lang="en-US" sz="1400" dirty="0">
+                <a:solidFill>
+                  <a:srgbClr val="31859C"/>
+                </a:solidFill>
+              </a:rPr>
+              <a:t>Fast, isolated development environments using Docker.</a:t>
+            </a:r>
+          </a:p>
+          <a:p>
+            <a:r>
+              <a:rPr lang="en-US" sz="1400" dirty="0">
+                <a:solidFill>
+                  <a:srgbClr val="31859C"/>
+                </a:solidFill>
+              </a:rPr>
+              <a:t>Quick and easy to start</a:t>
+            </a:r>
+          </a:p>
+          <a:p>
+            <a:endParaRPr lang="en-IN" dirty="0"/>
+          </a:p>
+        </p:txBody>
+      </p:sp>
+      <p:pic>
+        <p:nvPicPr>
+          <p:cNvPr id="8" name="Picture 7">
+            <a:extLst>
+              <a:ext uri="{FF2B5EF4-FFF2-40B4-BE49-F238E27FC236}">
+                <a16:creationId xmlns:a16="http://schemas.microsoft.com/office/drawing/2014/main" id="{7FFE4B8D-5615-A5B7-0D32-8038948A5205}"/>
+              </a:ext>
+            </a:extLst>
+          </p:cNvPr>
+          <p:cNvPicPr>
+            <a:picLocks noChangeAspect="1"/>
+          </p:cNvPicPr>
+          <p:nvPr/>
+        </p:nvPicPr>
+        <p:blipFill>
+          <a:blip r:embed="rId2">
+            <a:extLst>
+              <a:ext uri="{28A0092B-C50C-407E-A947-70E740481C1C}">
+                <a14:useLocalDpi xmlns:a14="http://schemas.microsoft.com/office/drawing/2010/main" val="0"/>
+              </a:ext>
+            </a:extLst>
+          </a:blip>
+          <a:stretch>
+            <a:fillRect/>
+          </a:stretch>
+        </p:blipFill>
+        <p:spPr>
+          <a:xfrm>
+            <a:off x="144050" y="3577259"/>
+            <a:ext cx="6884360" cy="3280741"/>
+          </a:xfrm>
+          <a:prstGeom prst="rect">
+            <a:avLst/>
+          </a:prstGeom>
+        </p:spPr>
+      </p:pic>
+      <p:pic>
+        <p:nvPicPr>
+          <p:cNvPr id="10" name="Picture 9">
+            <a:extLst>
+              <a:ext uri="{FF2B5EF4-FFF2-40B4-BE49-F238E27FC236}">
+                <a16:creationId xmlns:a16="http://schemas.microsoft.com/office/drawing/2014/main" id="{F299BAE2-79FE-9972-A389-DAB5F1740E1B}"/>
+              </a:ext>
+            </a:extLst>
+          </p:cNvPr>
+          <p:cNvPicPr>
+            <a:picLocks noChangeAspect="1"/>
+          </p:cNvPicPr>
+          <p:nvPr/>
+        </p:nvPicPr>
+        <p:blipFill>
+          <a:blip r:embed="rId3">
+            <a:extLst>
+              <a:ext uri="{28A0092B-C50C-407E-A947-70E740481C1C}">
+                <a14:useLocalDpi xmlns:a14="http://schemas.microsoft.com/office/drawing/2010/main" val="0"/>
+              </a:ext>
+            </a:extLst>
+          </a:blip>
+          <a:stretch>
+            <a:fillRect/>
+          </a:stretch>
+        </p:blipFill>
+        <p:spPr>
+          <a:xfrm>
+            <a:off x="6884360" y="2394045"/>
+            <a:ext cx="5307640" cy="4463955"/>
+          </a:xfrm>
+          <a:prstGeom prst="rect">
+            <a:avLst/>
+          </a:prstGeom>
+        </p:spPr>
+      </p:pic>
+    </p:spTree>
+    <p:extLst>
+      <p:ext uri="{BB962C8B-B14F-4D97-AF65-F5344CB8AC3E}">
+        <p14:creationId xmlns:p14="http://schemas.microsoft.com/office/powerpoint/2010/main" val="2454311313"/>
       </p:ext>
     </p:extLst>
   </p:cSld>
@@ -14850,7 +15942,7 @@
                                           </p:stCondLst>
                                         </p:cTn>
                                         <p:tgtEl>
-                                          <p:spTgt spid="4"/>
+                                          <p:spTgt spid="8"/>
                                         </p:tgtEl>
                                         <p:attrNameLst>
                                           <p:attrName>style.visibility</p:attrName>
@@ -14864,7 +15956,7 @@
                                       <p:cBhvr>
                                         <p:cTn id="41" dur="1000"/>
                                         <p:tgtEl>
-                                          <p:spTgt spid="4"/>
+                                          <p:spTgt spid="8"/>
                                         </p:tgtEl>
                                       </p:cBhvr>
                                     </p:animEffect>
@@ -14872,7 +15964,7 @@
                                       <p:cBhvr>
                                         <p:cTn id="42" dur="1000" fill="hold"/>
                                         <p:tgtEl>
-                                          <p:spTgt spid="4"/>
+                                          <p:spTgt spid="8"/>
                                         </p:tgtEl>
                                         <p:attrNameLst>
                                           <p:attrName>ppt_x</p:attrName>
@@ -14895,7 +15987,106 @@
                                       <p:cBhvr>
                                         <p:cTn id="43" dur="1000" fill="hold"/>
                                         <p:tgtEl>
-                                          <p:spTgt spid="4"/>
+                                          <p:spTgt spid="8"/>
+                                        </p:tgtEl>
+                                        <p:attrNameLst>
+                                          <p:attrName>ppt_y</p:attrName>
+                                        </p:attrNameLst>
+                                      </p:cBhvr>
+                                      <p:tavLst>
+                                        <p:tav tm="0">
+                                          <p:val>
+                                            <p:strVal val="#ppt_y+.1"/>
+                                          </p:val>
+                                        </p:tav>
+                                        <p:tav tm="100000">
+                                          <p:val>
+                                            <p:strVal val="#ppt_y"/>
+                                          </p:val>
+                                        </p:tav>
+                                      </p:tavLst>
+                                    </p:anim>
+                                  </p:childTnLst>
+                                </p:cTn>
+                              </p:par>
+                            </p:childTnLst>
+                          </p:cTn>
+                        </p:par>
+                      </p:childTnLst>
+                    </p:cTn>
+                  </p:par>
+                  <p:par>
+                    <p:cTn id="44" fill="hold">
+                      <p:stCondLst>
+                        <p:cond delay="indefinite"/>
+                      </p:stCondLst>
+                      <p:childTnLst>
+                        <p:par>
+                          <p:cTn id="45" fill="hold">
+                            <p:stCondLst>
+                              <p:cond delay="0"/>
+                            </p:stCondLst>
+                            <p:childTnLst>
+                              <p:par>
+                                <p:cTn id="46" presetID="42" presetClass="entr" presetSubtype="0" fill="hold" nodeType="clickEffect">
+                                  <p:stCondLst>
+                                    <p:cond delay="0"/>
+                                  </p:stCondLst>
+                                  <p:childTnLst>
+                                    <p:set>
+                                      <p:cBhvr>
+                                        <p:cTn id="47" dur="1" fill="hold">
+                                          <p:stCondLst>
+                                            <p:cond delay="0"/>
+                                          </p:stCondLst>
+                                        </p:cTn>
+                                        <p:tgtEl>
+                                          <p:spTgt spid="10"/>
+                                        </p:tgtEl>
+                                        <p:attrNameLst>
+                                          <p:attrName>style.visibility</p:attrName>
+                                        </p:attrNameLst>
+                                      </p:cBhvr>
+                                      <p:to>
+                                        <p:strVal val="visible"/>
+                                      </p:to>
+                                    </p:set>
+                                    <p:animEffect transition="in" filter="fade">
+                                      <p:cBhvr>
+                                        <p:cTn id="48" dur="1000"/>
+                                        <p:tgtEl>
+                                          <p:spTgt spid="10"/>
+                                        </p:tgtEl>
+                                      </p:cBhvr>
+                                    </p:animEffect>
+                                    <p:anim calcmode="lin" valueType="num">
+                                      <p:cBhvr>
+                                        <p:cTn id="49" dur="1000" fill="hold"/>
+                                        <p:tgtEl>
+                                          <p:spTgt spid="10"/>
+                                        </p:tgtEl>
+                                        <p:attrNameLst>
+                                          <p:attrName>ppt_x</p:attrName>
+                                        </p:attrNameLst>
+                                      </p:cBhvr>
+                                      <p:tavLst>
+                                        <p:tav tm="0">
+                                          <p:val>
+                                            <p:strVal val="#ppt_x"/>
+                                          </p:val>
+                                        </p:tav>
+                                        <p:tav tm="100000">
+                                          <p:val>
+                                            <p:strVal val="#ppt_x"/>
+                                          </p:val>
+                                        </p:tav>
+                                      </p:tavLst>
+                                    </p:anim>
+                                    <p:anim calcmode="lin" valueType="num">
+                                      <p:cBhvr>
+                                        <p:cTn id="50" dur="1000" fill="hold"/>
+                                        <p:tgtEl>
+                                          <p:spTgt spid="10"/>
                                         </p:tgtEl>
                                         <p:attrNameLst>
                                           <p:attrName>ppt_y</p:attrName>
@@ -14952,7 +16143,7 @@
 </p:sld>
 </file>
 
-<file path=ppt/slides/slide4.xml><?xml version="1.0" encoding="utf-8"?>
+<file path=ppt/slides/slide6.xml><?xml version="1.0" encoding="utf-8"?>
 <p:sld xmlns:a="http://schemas.openxmlformats.org/drawingml/2006/main" xmlns:r="http://schemas.openxmlformats.org/officeDocument/2006/relationships" xmlns:p="http://schemas.openxmlformats.org/presentationml/2006/main">
   <p:cSld>
     <p:spTree>
@@ -15017,30 +16208,118 @@
         <p:spPr>
           <a:xfrm>
             <a:off x="1154954" y="2603500"/>
-            <a:ext cx="9845981" cy="3416300"/>
+            <a:ext cx="9845981" cy="3712894"/>
           </a:xfrm>
         </p:spPr>
         <p:txBody>
           <a:bodyPr>
-            <a:normAutofit/>
+            <a:normAutofit fontScale="77500" lnSpcReduction="20000"/>
           </a:bodyPr>
           <a:lstStyle/>
+          <a:p>
+            <a:r>
+              <a:rPr lang="en-IN" dirty="0"/>
+              <a:t>Docker Volume details</a:t>
+            </a:r>
+          </a:p>
+          <a:p>
+            <a:pPr lvl="1">
+              <a:buFont typeface="Wingdings" panose="05000000000000000000" pitchFamily="2" charset="2"/>
+              <a:buChar char="Ø"/>
+            </a:pPr>
+            <a:r>
+              <a:rPr lang="en-IN" dirty="0"/>
+              <a:t>https://docs.docker.com/engine/reference/commandline/volume_create/</a:t>
+            </a:r>
+          </a:p>
+          <a:p>
+            <a:pPr lvl="1">
+              <a:buFont typeface="Wingdings" panose="05000000000000000000" pitchFamily="2" charset="2"/>
+              <a:buChar char="Ø"/>
+            </a:pPr>
+            <a:r>
+              <a:rPr lang="en-IN" dirty="0">
+                <a:hlinkClick r:id="rId2"/>
+              </a:rPr>
+              <a:t>https://www.baeldung.com/ops/docker-volumes</a:t>
+            </a:r>
+            <a:endParaRPr lang="en-IN" dirty="0"/>
+          </a:p>
+          <a:p>
+            <a:pPr lvl="1">
+              <a:buFont typeface="Wingdings" panose="05000000000000000000" pitchFamily="2" charset="2"/>
+              <a:buChar char="Ø"/>
+            </a:pPr>
+            <a:r>
+              <a:rPr lang="en-IN" dirty="0"/>
+              <a:t>https://www.freecodecamp.org/news/docker-mount-volume-guide-how-to-mount-a-local-directory/</a:t>
+            </a:r>
+          </a:p>
+          <a:p>
+            <a:pPr lvl="1">
+              <a:buFont typeface="Wingdings" panose="05000000000000000000" pitchFamily="2" charset="2"/>
+              <a:buChar char="Ø"/>
+            </a:pPr>
+            <a:r>
+              <a:rPr lang="en-IN" dirty="0" err="1"/>
+              <a:t>Tmpfs</a:t>
+            </a:r>
+            <a:r>
+              <a:rPr lang="en-IN" dirty="0"/>
+              <a:t> - https://bobcares.com/blog/tmpfs-docker-and-its-function/</a:t>
+            </a:r>
+          </a:p>
+          <a:p>
+            <a:r>
+              <a:rPr lang="en-IN" dirty="0"/>
+              <a:t>Multi Stage build</a:t>
+            </a:r>
+          </a:p>
+          <a:p>
+            <a:pPr lvl="1">
+              <a:buFont typeface="Wingdings" panose="05000000000000000000" pitchFamily="2" charset="2"/>
+              <a:buChar char="Ø"/>
+            </a:pPr>
+            <a:r>
+              <a:rPr lang="en-IN" dirty="0"/>
+              <a:t>https://www.freecodecamp.org/news/docker-mount-volume-guide-how-to-mount-a-local-directory/</a:t>
+            </a:r>
+          </a:p>
+          <a:p>
+            <a:r>
+              <a:rPr lang="en-IN" dirty="0"/>
+              <a:t>YAML Quick Reference - </a:t>
+            </a:r>
+            <a:r>
+              <a:rPr lang="en-IN" dirty="0">
+                <a:hlinkClick r:id="rId3"/>
+              </a:rPr>
+              <a:t>https://www.cloudbees.com/blog/yaml-tutorial-everything-you-need-get-started</a:t>
+            </a:r>
+            <a:endParaRPr lang="en-IN" dirty="0"/>
+          </a:p>
+          <a:p>
+            <a:r>
+              <a:rPr lang="en-IN" dirty="0"/>
+              <a:t>JSON to YAML conversion</a:t>
+            </a:r>
+          </a:p>
+          <a:p>
+            <a:r>
+              <a:rPr lang="en-IN" dirty="0"/>
+              <a:t>Docker Compose Details</a:t>
+            </a:r>
+          </a:p>
+          <a:p>
+            <a:r>
+              <a:rPr lang="en-IN" dirty="0"/>
+              <a:t>Docker Network Details</a:t>
+            </a:r>
+          </a:p>
           <a:p>
             <a:r>
               <a:rPr lang="en-IN" dirty="0"/>
               <a:t>Docker command Executed reference guide</a:t>
-            </a:r>
-          </a:p>
-          <a:p>
-            <a:r>
-              <a:rPr lang="en-IN" dirty="0"/>
-              <a:t>Docker Swarm Referenced Architecture</a:t>
-            </a:r>
-          </a:p>
-          <a:p>
-            <a:r>
-              <a:rPr lang="en-IN" dirty="0"/>
-              <a:t>Other references</a:t>
             </a:r>
           </a:p>
           <a:p>

</xml_diff>

<commit_message>
Day 10 and 11 Details updated
</commit_message>
<xml_diff>
--- a/Day10/DockerAndKubernetes_Training-Day10.pptx
+++ b/Day10/DockerAndKubernetes_Training-Day10.pptx
@@ -5,15 +5,13 @@
     <p:sldMasterId id="2147483880" r:id="rId1"/>
   </p:sldMasterIdLst>
   <p:notesMasterIdLst>
-    <p:notesMasterId r:id="rId8"/>
+    <p:notesMasterId r:id="rId6"/>
   </p:notesMasterIdLst>
   <p:sldIdLst>
     <p:sldId id="439" r:id="rId2"/>
     <p:sldId id="442" r:id="rId3"/>
     <p:sldId id="443" r:id="rId4"/>
-    <p:sldId id="266" r:id="rId5"/>
-    <p:sldId id="288" r:id="rId6"/>
-    <p:sldId id="438" r:id="rId7"/>
+    <p:sldId id="438" r:id="rId5"/>
   </p:sldIdLst>
   <p:sldSz cx="12192000" cy="6858000"/>
   <p:notesSz cx="6858000" cy="9144000"/>
@@ -14136,40 +14134,16 @@
             </a:r>
           </a:p>
           <a:p>
+            <a:pPr lvl="1"/>
+            <a:r>
+              <a:rPr lang="en-US" dirty="0"/>
+              <a:t>Volume share between running containers</a:t>
+            </a:r>
+          </a:p>
+          <a:p>
             <a:r>
               <a:rPr lang="en-US" dirty="0"/>
               <a:t>Docker Multi Stage Build</a:t>
-            </a:r>
-          </a:p>
-          <a:p>
-            <a:r>
-              <a:rPr lang="en-US"/>
-              <a:t>YAML understanding</a:t>
-            </a:r>
-            <a:endParaRPr lang="en-US" dirty="0"/>
-          </a:p>
-          <a:p>
-            <a:r>
-              <a:rPr lang="en-US" dirty="0"/>
-              <a:t>Need of Docker Compose</a:t>
-            </a:r>
-          </a:p>
-          <a:p>
-            <a:r>
-              <a:rPr lang="en-US" dirty="0"/>
-              <a:t>Docker Compose file – Example/Brief</a:t>
-            </a:r>
-          </a:p>
-          <a:p>
-            <a:r>
-              <a:rPr lang="en-US" dirty="0"/>
-              <a:t>Docker Network</a:t>
-            </a:r>
-          </a:p>
-          <a:p>
-            <a:r>
-              <a:rPr lang="en-US" dirty="0"/>
-              <a:t>Docker compose - Demo</a:t>
             </a:r>
           </a:p>
           <a:p>
@@ -14427,1744 +14401,6 @@
           <p:cNvPr id="2" name="Title 1">
             <a:extLst>
               <a:ext uri="{FF2B5EF4-FFF2-40B4-BE49-F238E27FC236}">
-                <a16:creationId xmlns:a16="http://schemas.microsoft.com/office/drawing/2014/main" id="{97BC34CC-2191-086A-75CD-07624340C7B3}"/>
-              </a:ext>
-            </a:extLst>
-          </p:cNvPr>
-          <p:cNvSpPr>
-            <a:spLocks noGrp="1"/>
-          </p:cNvSpPr>
-          <p:nvPr>
-            <p:ph type="title"/>
-          </p:nvPr>
-        </p:nvSpPr>
-        <p:spPr>
-          <a:xfrm>
-            <a:off x="1154953" y="973668"/>
-            <a:ext cx="9128734" cy="706964"/>
-          </a:xfrm>
-        </p:spPr>
-        <p:txBody>
-          <a:bodyPr>
-            <a:normAutofit/>
-          </a:bodyPr>
-          <a:lstStyle/>
-          <a:p>
-            <a:r>
-              <a:rPr lang="en-US" sz="2800" dirty="0"/>
-              <a:t>DOCKER COMPOSE – NEED OF ORCHESTRATION</a:t>
-            </a:r>
-            <a:endParaRPr lang="en-IN" sz="2800" dirty="0"/>
-          </a:p>
-        </p:txBody>
-      </p:sp>
-      <p:sp>
-        <p:nvSpPr>
-          <p:cNvPr id="3" name="Content Placeholder 2">
-            <a:extLst>
-              <a:ext uri="{FF2B5EF4-FFF2-40B4-BE49-F238E27FC236}">
-                <a16:creationId xmlns:a16="http://schemas.microsoft.com/office/drawing/2014/main" id="{5188517A-DD37-A765-9F25-8A87477F3848}"/>
-              </a:ext>
-            </a:extLst>
-          </p:cNvPr>
-          <p:cNvSpPr>
-            <a:spLocks noGrp="1"/>
-          </p:cNvSpPr>
-          <p:nvPr>
-            <p:ph idx="1"/>
-          </p:nvPr>
-        </p:nvSpPr>
-        <p:spPr>
-          <a:xfrm>
-            <a:off x="132524" y="2222776"/>
-            <a:ext cx="10429460" cy="706964"/>
-          </a:xfrm>
-        </p:spPr>
-        <p:txBody>
-          <a:bodyPr>
-            <a:noAutofit/>
-          </a:bodyPr>
-          <a:lstStyle/>
-          <a:p>
-            <a:r>
-              <a:rPr lang="en-US" sz="1400" dirty="0"/>
-              <a:t>Problems with standalone Docker Running a server cluster on a set of Docker containers, on a single Docker host is vulnerable to single point of failure !!!</a:t>
-            </a:r>
-            <a:endParaRPr lang="en-IN" sz="1400" dirty="0"/>
-          </a:p>
-        </p:txBody>
-      </p:sp>
-      <p:pic>
-        <p:nvPicPr>
-          <p:cNvPr id="4" name="Picture 3">
-            <a:extLst>
-              <a:ext uri="{FF2B5EF4-FFF2-40B4-BE49-F238E27FC236}">
-                <a16:creationId xmlns:a16="http://schemas.microsoft.com/office/drawing/2014/main" id="{883D2B19-66CF-4EB1-E5A5-4343F6B98C0F}"/>
-              </a:ext>
-            </a:extLst>
-          </p:cNvPr>
-          <p:cNvPicPr>
-            <a:picLocks noChangeAspect="1"/>
-          </p:cNvPicPr>
-          <p:nvPr/>
-        </p:nvPicPr>
-        <p:blipFill>
-          <a:blip r:embed="rId2">
-            <a:extLst>
-              <a:ext uri="{28A0092B-C50C-407E-A947-70E740481C1C}">
-                <a14:useLocalDpi xmlns:a14="http://schemas.microsoft.com/office/drawing/2010/main" val="0"/>
-              </a:ext>
-            </a:extLst>
-          </a:blip>
-          <a:stretch>
-            <a:fillRect/>
-          </a:stretch>
-        </p:blipFill>
-        <p:spPr>
-          <a:xfrm>
-            <a:off x="410817" y="3111682"/>
-            <a:ext cx="5486400" cy="3633675"/>
-          </a:xfrm>
-          <a:prstGeom prst="rect">
-            <a:avLst/>
-          </a:prstGeom>
-        </p:spPr>
-      </p:pic>
-      <p:pic>
-        <p:nvPicPr>
-          <p:cNvPr id="5" name="Picture 4">
-            <a:extLst>
-              <a:ext uri="{FF2B5EF4-FFF2-40B4-BE49-F238E27FC236}">
-                <a16:creationId xmlns:a16="http://schemas.microsoft.com/office/drawing/2014/main" id="{A4C80C9E-D7FA-95D1-6CCF-318749D2CF54}"/>
-              </a:ext>
-            </a:extLst>
-          </p:cNvPr>
-          <p:cNvPicPr>
-            <a:picLocks noChangeAspect="1"/>
-          </p:cNvPicPr>
-          <p:nvPr/>
-        </p:nvPicPr>
-        <p:blipFill>
-          <a:blip r:embed="rId3">
-            <a:extLst>
-              <a:ext uri="{28A0092B-C50C-407E-A947-70E740481C1C}">
-                <a14:useLocalDpi xmlns:a14="http://schemas.microsoft.com/office/drawing/2010/main" val="0"/>
-              </a:ext>
-            </a:extLst>
-          </a:blip>
-          <a:stretch>
-            <a:fillRect/>
-          </a:stretch>
-        </p:blipFill>
-        <p:spPr>
-          <a:xfrm>
-            <a:off x="6096000" y="3111682"/>
-            <a:ext cx="5963477" cy="3623589"/>
-          </a:xfrm>
-          <a:prstGeom prst="rect">
-            <a:avLst/>
-          </a:prstGeom>
-        </p:spPr>
-      </p:pic>
-      <p:pic>
-        <p:nvPicPr>
-          <p:cNvPr id="6" name="Picture 5">
-            <a:extLst>
-              <a:ext uri="{FF2B5EF4-FFF2-40B4-BE49-F238E27FC236}">
-                <a16:creationId xmlns:a16="http://schemas.microsoft.com/office/drawing/2014/main" id="{97CF575D-AAD9-658A-4EA8-443237AB3ED2}"/>
-              </a:ext>
-            </a:extLst>
-          </p:cNvPr>
-          <p:cNvPicPr>
-            <a:picLocks noChangeAspect="1"/>
-          </p:cNvPicPr>
-          <p:nvPr/>
-        </p:nvPicPr>
-        <p:blipFill>
-          <a:blip r:embed="rId4">
-            <a:extLst>
-              <a:ext uri="{28A0092B-C50C-407E-A947-70E740481C1C}">
-                <a14:useLocalDpi xmlns:a14="http://schemas.microsoft.com/office/drawing/2010/main" val="0"/>
-              </a:ext>
-            </a:extLst>
-          </a:blip>
-          <a:stretch>
-            <a:fillRect/>
-          </a:stretch>
-        </p:blipFill>
-        <p:spPr>
-          <a:xfrm>
-            <a:off x="10442712" y="1881809"/>
-            <a:ext cx="1749287" cy="1229873"/>
-          </a:xfrm>
-          <a:prstGeom prst="rect">
-            <a:avLst/>
-          </a:prstGeom>
-        </p:spPr>
-      </p:pic>
-    </p:spTree>
-    <p:extLst>
-      <p:ext uri="{BB962C8B-B14F-4D97-AF65-F5344CB8AC3E}">
-        <p14:creationId xmlns:p14="http://schemas.microsoft.com/office/powerpoint/2010/main" val="3389861919"/>
-      </p:ext>
-    </p:extLst>
-  </p:cSld>
-  <p:clrMapOvr>
-    <a:masterClrMapping/>
-  </p:clrMapOvr>
-  <p:timing>
-    <p:tnLst>
-      <p:par>
-        <p:cTn id="1" dur="indefinite" restart="never" nodeType="tmRoot">
-          <p:childTnLst>
-            <p:seq concurrent="1" nextAc="seek">
-              <p:cTn id="2" dur="indefinite" nodeType="mainSeq">
-                <p:childTnLst>
-                  <p:par>
-                    <p:cTn id="3" fill="hold">
-                      <p:stCondLst>
-                        <p:cond delay="indefinite"/>
-                      </p:stCondLst>
-                      <p:childTnLst>
-                        <p:par>
-                          <p:cTn id="4" fill="hold">
-                            <p:stCondLst>
-                              <p:cond delay="0"/>
-                            </p:stCondLst>
-                            <p:childTnLst>
-                              <p:par>
-                                <p:cTn id="5" presetID="2" presetClass="entr" presetSubtype="4" fill="hold" grpId="0" nodeType="clickEffect">
-                                  <p:stCondLst>
-                                    <p:cond delay="0"/>
-                                  </p:stCondLst>
-                                  <p:childTnLst>
-                                    <p:set>
-                                      <p:cBhvr>
-                                        <p:cTn id="6" dur="1" fill="hold">
-                                          <p:stCondLst>
-                                            <p:cond delay="0"/>
-                                          </p:stCondLst>
-                                        </p:cTn>
-                                        <p:tgtEl>
-                                          <p:spTgt spid="2"/>
-                                        </p:tgtEl>
-                                        <p:attrNameLst>
-                                          <p:attrName>style.visibility</p:attrName>
-                                        </p:attrNameLst>
-                                      </p:cBhvr>
-                                      <p:to>
-                                        <p:strVal val="visible"/>
-                                      </p:to>
-                                    </p:set>
-                                    <p:anim calcmode="lin" valueType="num">
-                                      <p:cBhvr additive="base">
-                                        <p:cTn id="7" dur="500" fill="hold"/>
-                                        <p:tgtEl>
-                                          <p:spTgt spid="2"/>
-                                        </p:tgtEl>
-                                        <p:attrNameLst>
-                                          <p:attrName>ppt_x</p:attrName>
-                                        </p:attrNameLst>
-                                      </p:cBhvr>
-                                      <p:tavLst>
-                                        <p:tav tm="0">
-                                          <p:val>
-                                            <p:strVal val="#ppt_x"/>
-                                          </p:val>
-                                        </p:tav>
-                                        <p:tav tm="100000">
-                                          <p:val>
-                                            <p:strVal val="#ppt_x"/>
-                                          </p:val>
-                                        </p:tav>
-                                      </p:tavLst>
-                                    </p:anim>
-                                    <p:anim calcmode="lin" valueType="num">
-                                      <p:cBhvr additive="base">
-                                        <p:cTn id="8" dur="500" fill="hold"/>
-                                        <p:tgtEl>
-                                          <p:spTgt spid="2"/>
-                                        </p:tgtEl>
-                                        <p:attrNameLst>
-                                          <p:attrName>ppt_y</p:attrName>
-                                        </p:attrNameLst>
-                                      </p:cBhvr>
-                                      <p:tavLst>
-                                        <p:tav tm="0">
-                                          <p:val>
-                                            <p:strVal val="1+#ppt_h/2"/>
-                                          </p:val>
-                                        </p:tav>
-                                        <p:tav tm="100000">
-                                          <p:val>
-                                            <p:strVal val="#ppt_y"/>
-                                          </p:val>
-                                        </p:tav>
-                                      </p:tavLst>
-                                    </p:anim>
-                                  </p:childTnLst>
-                                </p:cTn>
-                              </p:par>
-                            </p:childTnLst>
-                          </p:cTn>
-                        </p:par>
-                      </p:childTnLst>
-                    </p:cTn>
-                  </p:par>
-                  <p:par>
-                    <p:cTn id="9" fill="hold">
-                      <p:stCondLst>
-                        <p:cond delay="indefinite"/>
-                      </p:stCondLst>
-                      <p:childTnLst>
-                        <p:par>
-                          <p:cTn id="10" fill="hold">
-                            <p:stCondLst>
-                              <p:cond delay="0"/>
-                            </p:stCondLst>
-                            <p:childTnLst>
-                              <p:par>
-                                <p:cTn id="11" presetID="42" presetClass="entr" presetSubtype="0" fill="hold" grpId="0" nodeType="clickEffect">
-                                  <p:stCondLst>
-                                    <p:cond delay="0"/>
-                                  </p:stCondLst>
-                                  <p:childTnLst>
-                                    <p:set>
-                                      <p:cBhvr>
-                                        <p:cTn id="12" dur="1" fill="hold">
-                                          <p:stCondLst>
-                                            <p:cond delay="0"/>
-                                          </p:stCondLst>
-                                        </p:cTn>
-                                        <p:tgtEl>
-                                          <p:spTgt spid="3">
-                                            <p:txEl>
-                                              <p:pRg st="0" end="0"/>
-                                            </p:txEl>
-                                          </p:spTgt>
-                                        </p:tgtEl>
-                                        <p:attrNameLst>
-                                          <p:attrName>style.visibility</p:attrName>
-                                        </p:attrNameLst>
-                                      </p:cBhvr>
-                                      <p:to>
-                                        <p:strVal val="visible"/>
-                                      </p:to>
-                                    </p:set>
-                                    <p:animEffect transition="in" filter="fade">
-                                      <p:cBhvr>
-                                        <p:cTn id="13" dur="1000"/>
-                                        <p:tgtEl>
-                                          <p:spTgt spid="3">
-                                            <p:txEl>
-                                              <p:pRg st="0" end="0"/>
-                                            </p:txEl>
-                                          </p:spTgt>
-                                        </p:tgtEl>
-                                      </p:cBhvr>
-                                    </p:animEffect>
-                                    <p:anim calcmode="lin" valueType="num">
-                                      <p:cBhvr>
-                                        <p:cTn id="14" dur="1000" fill="hold"/>
-                                        <p:tgtEl>
-                                          <p:spTgt spid="3">
-                                            <p:txEl>
-                                              <p:pRg st="0" end="0"/>
-                                            </p:txEl>
-                                          </p:spTgt>
-                                        </p:tgtEl>
-                                        <p:attrNameLst>
-                                          <p:attrName>ppt_x</p:attrName>
-                                        </p:attrNameLst>
-                                      </p:cBhvr>
-                                      <p:tavLst>
-                                        <p:tav tm="0">
-                                          <p:val>
-                                            <p:strVal val="#ppt_x"/>
-                                          </p:val>
-                                        </p:tav>
-                                        <p:tav tm="100000">
-                                          <p:val>
-                                            <p:strVal val="#ppt_x"/>
-                                          </p:val>
-                                        </p:tav>
-                                      </p:tavLst>
-                                    </p:anim>
-                                    <p:anim calcmode="lin" valueType="num">
-                                      <p:cBhvr>
-                                        <p:cTn id="15" dur="1000" fill="hold"/>
-                                        <p:tgtEl>
-                                          <p:spTgt spid="3">
-                                            <p:txEl>
-                                              <p:pRg st="0" end="0"/>
-                                            </p:txEl>
-                                          </p:spTgt>
-                                        </p:tgtEl>
-                                        <p:attrNameLst>
-                                          <p:attrName>ppt_y</p:attrName>
-                                        </p:attrNameLst>
-                                      </p:cBhvr>
-                                      <p:tavLst>
-                                        <p:tav tm="0">
-                                          <p:val>
-                                            <p:strVal val="#ppt_y+.1"/>
-                                          </p:val>
-                                        </p:tav>
-                                        <p:tav tm="100000">
-                                          <p:val>
-                                            <p:strVal val="#ppt_y"/>
-                                          </p:val>
-                                        </p:tav>
-                                      </p:tavLst>
-                                    </p:anim>
-                                  </p:childTnLst>
-                                </p:cTn>
-                              </p:par>
-                            </p:childTnLst>
-                          </p:cTn>
-                        </p:par>
-                      </p:childTnLst>
-                    </p:cTn>
-                  </p:par>
-                  <p:par>
-                    <p:cTn id="16" fill="hold">
-                      <p:stCondLst>
-                        <p:cond delay="indefinite"/>
-                      </p:stCondLst>
-                      <p:childTnLst>
-                        <p:par>
-                          <p:cTn id="17" fill="hold">
-                            <p:stCondLst>
-                              <p:cond delay="0"/>
-                            </p:stCondLst>
-                            <p:childTnLst>
-                              <p:par>
-                                <p:cTn id="18" presetID="42" presetClass="entr" presetSubtype="0" fill="hold" nodeType="clickEffect">
-                                  <p:stCondLst>
-                                    <p:cond delay="0"/>
-                                  </p:stCondLst>
-                                  <p:childTnLst>
-                                    <p:set>
-                                      <p:cBhvr>
-                                        <p:cTn id="19" dur="1" fill="hold">
-                                          <p:stCondLst>
-                                            <p:cond delay="0"/>
-                                          </p:stCondLst>
-                                        </p:cTn>
-                                        <p:tgtEl>
-                                          <p:spTgt spid="6"/>
-                                        </p:tgtEl>
-                                        <p:attrNameLst>
-                                          <p:attrName>style.visibility</p:attrName>
-                                        </p:attrNameLst>
-                                      </p:cBhvr>
-                                      <p:to>
-                                        <p:strVal val="visible"/>
-                                      </p:to>
-                                    </p:set>
-                                    <p:animEffect transition="in" filter="fade">
-                                      <p:cBhvr>
-                                        <p:cTn id="20" dur="1000"/>
-                                        <p:tgtEl>
-                                          <p:spTgt spid="6"/>
-                                        </p:tgtEl>
-                                      </p:cBhvr>
-                                    </p:animEffect>
-                                    <p:anim calcmode="lin" valueType="num">
-                                      <p:cBhvr>
-                                        <p:cTn id="21" dur="1000" fill="hold"/>
-                                        <p:tgtEl>
-                                          <p:spTgt spid="6"/>
-                                        </p:tgtEl>
-                                        <p:attrNameLst>
-                                          <p:attrName>ppt_x</p:attrName>
-                                        </p:attrNameLst>
-                                      </p:cBhvr>
-                                      <p:tavLst>
-                                        <p:tav tm="0">
-                                          <p:val>
-                                            <p:strVal val="#ppt_x"/>
-                                          </p:val>
-                                        </p:tav>
-                                        <p:tav tm="100000">
-                                          <p:val>
-                                            <p:strVal val="#ppt_x"/>
-                                          </p:val>
-                                        </p:tav>
-                                      </p:tavLst>
-                                    </p:anim>
-                                    <p:anim calcmode="lin" valueType="num">
-                                      <p:cBhvr>
-                                        <p:cTn id="22" dur="1000" fill="hold"/>
-                                        <p:tgtEl>
-                                          <p:spTgt spid="6"/>
-                                        </p:tgtEl>
-                                        <p:attrNameLst>
-                                          <p:attrName>ppt_y</p:attrName>
-                                        </p:attrNameLst>
-                                      </p:cBhvr>
-                                      <p:tavLst>
-                                        <p:tav tm="0">
-                                          <p:val>
-                                            <p:strVal val="#ppt_y+.1"/>
-                                          </p:val>
-                                        </p:tav>
-                                        <p:tav tm="100000">
-                                          <p:val>
-                                            <p:strVal val="#ppt_y"/>
-                                          </p:val>
-                                        </p:tav>
-                                      </p:tavLst>
-                                    </p:anim>
-                                  </p:childTnLst>
-                                </p:cTn>
-                              </p:par>
-                            </p:childTnLst>
-                          </p:cTn>
-                        </p:par>
-                      </p:childTnLst>
-                    </p:cTn>
-                  </p:par>
-                  <p:par>
-                    <p:cTn id="23" fill="hold">
-                      <p:stCondLst>
-                        <p:cond delay="indefinite"/>
-                      </p:stCondLst>
-                      <p:childTnLst>
-                        <p:par>
-                          <p:cTn id="24" fill="hold">
-                            <p:stCondLst>
-                              <p:cond delay="0"/>
-                            </p:stCondLst>
-                            <p:childTnLst>
-                              <p:par>
-                                <p:cTn id="25" presetID="42" presetClass="entr" presetSubtype="0" fill="hold" nodeType="clickEffect">
-                                  <p:stCondLst>
-                                    <p:cond delay="0"/>
-                                  </p:stCondLst>
-                                  <p:childTnLst>
-                                    <p:set>
-                                      <p:cBhvr>
-                                        <p:cTn id="26" dur="1" fill="hold">
-                                          <p:stCondLst>
-                                            <p:cond delay="0"/>
-                                          </p:stCondLst>
-                                        </p:cTn>
-                                        <p:tgtEl>
-                                          <p:spTgt spid="4"/>
-                                        </p:tgtEl>
-                                        <p:attrNameLst>
-                                          <p:attrName>style.visibility</p:attrName>
-                                        </p:attrNameLst>
-                                      </p:cBhvr>
-                                      <p:to>
-                                        <p:strVal val="visible"/>
-                                      </p:to>
-                                    </p:set>
-                                    <p:animEffect transition="in" filter="fade">
-                                      <p:cBhvr>
-                                        <p:cTn id="27" dur="1000"/>
-                                        <p:tgtEl>
-                                          <p:spTgt spid="4"/>
-                                        </p:tgtEl>
-                                      </p:cBhvr>
-                                    </p:animEffect>
-                                    <p:anim calcmode="lin" valueType="num">
-                                      <p:cBhvr>
-                                        <p:cTn id="28" dur="1000" fill="hold"/>
-                                        <p:tgtEl>
-                                          <p:spTgt spid="4"/>
-                                        </p:tgtEl>
-                                        <p:attrNameLst>
-                                          <p:attrName>ppt_x</p:attrName>
-                                        </p:attrNameLst>
-                                      </p:cBhvr>
-                                      <p:tavLst>
-                                        <p:tav tm="0">
-                                          <p:val>
-                                            <p:strVal val="#ppt_x"/>
-                                          </p:val>
-                                        </p:tav>
-                                        <p:tav tm="100000">
-                                          <p:val>
-                                            <p:strVal val="#ppt_x"/>
-                                          </p:val>
-                                        </p:tav>
-                                      </p:tavLst>
-                                    </p:anim>
-                                    <p:anim calcmode="lin" valueType="num">
-                                      <p:cBhvr>
-                                        <p:cTn id="29" dur="1000" fill="hold"/>
-                                        <p:tgtEl>
-                                          <p:spTgt spid="4"/>
-                                        </p:tgtEl>
-                                        <p:attrNameLst>
-                                          <p:attrName>ppt_y</p:attrName>
-                                        </p:attrNameLst>
-                                      </p:cBhvr>
-                                      <p:tavLst>
-                                        <p:tav tm="0">
-                                          <p:val>
-                                            <p:strVal val="#ppt_y+.1"/>
-                                          </p:val>
-                                        </p:tav>
-                                        <p:tav tm="100000">
-                                          <p:val>
-                                            <p:strVal val="#ppt_y"/>
-                                          </p:val>
-                                        </p:tav>
-                                      </p:tavLst>
-                                    </p:anim>
-                                  </p:childTnLst>
-                                </p:cTn>
-                              </p:par>
-                            </p:childTnLst>
-                          </p:cTn>
-                        </p:par>
-                      </p:childTnLst>
-                    </p:cTn>
-                  </p:par>
-                  <p:par>
-                    <p:cTn id="30" fill="hold">
-                      <p:stCondLst>
-                        <p:cond delay="indefinite"/>
-                      </p:stCondLst>
-                      <p:childTnLst>
-                        <p:par>
-                          <p:cTn id="31" fill="hold">
-                            <p:stCondLst>
-                              <p:cond delay="0"/>
-                            </p:stCondLst>
-                            <p:childTnLst>
-                              <p:par>
-                                <p:cTn id="32" presetID="42" presetClass="entr" presetSubtype="0" fill="hold" nodeType="clickEffect">
-                                  <p:stCondLst>
-                                    <p:cond delay="0"/>
-                                  </p:stCondLst>
-                                  <p:childTnLst>
-                                    <p:set>
-                                      <p:cBhvr>
-                                        <p:cTn id="33" dur="1" fill="hold">
-                                          <p:stCondLst>
-                                            <p:cond delay="0"/>
-                                          </p:stCondLst>
-                                        </p:cTn>
-                                        <p:tgtEl>
-                                          <p:spTgt spid="5"/>
-                                        </p:tgtEl>
-                                        <p:attrNameLst>
-                                          <p:attrName>style.visibility</p:attrName>
-                                        </p:attrNameLst>
-                                      </p:cBhvr>
-                                      <p:to>
-                                        <p:strVal val="visible"/>
-                                      </p:to>
-                                    </p:set>
-                                    <p:animEffect transition="in" filter="fade">
-                                      <p:cBhvr>
-                                        <p:cTn id="34" dur="1000"/>
-                                        <p:tgtEl>
-                                          <p:spTgt spid="5"/>
-                                        </p:tgtEl>
-                                      </p:cBhvr>
-                                    </p:animEffect>
-                                    <p:anim calcmode="lin" valueType="num">
-                                      <p:cBhvr>
-                                        <p:cTn id="35" dur="1000" fill="hold"/>
-                                        <p:tgtEl>
-                                          <p:spTgt spid="5"/>
-                                        </p:tgtEl>
-                                        <p:attrNameLst>
-                                          <p:attrName>ppt_x</p:attrName>
-                                        </p:attrNameLst>
-                                      </p:cBhvr>
-                                      <p:tavLst>
-                                        <p:tav tm="0">
-                                          <p:val>
-                                            <p:strVal val="#ppt_x"/>
-                                          </p:val>
-                                        </p:tav>
-                                        <p:tav tm="100000">
-                                          <p:val>
-                                            <p:strVal val="#ppt_x"/>
-                                          </p:val>
-                                        </p:tav>
-                                      </p:tavLst>
-                                    </p:anim>
-                                    <p:anim calcmode="lin" valueType="num">
-                                      <p:cBhvr>
-                                        <p:cTn id="36" dur="1000" fill="hold"/>
-                                        <p:tgtEl>
-                                          <p:spTgt spid="5"/>
-                                        </p:tgtEl>
-                                        <p:attrNameLst>
-                                          <p:attrName>ppt_y</p:attrName>
-                                        </p:attrNameLst>
-                                      </p:cBhvr>
-                                      <p:tavLst>
-                                        <p:tav tm="0">
-                                          <p:val>
-                                            <p:strVal val="#ppt_y+.1"/>
-                                          </p:val>
-                                        </p:tav>
-                                        <p:tav tm="100000">
-                                          <p:val>
-                                            <p:strVal val="#ppt_y"/>
-                                          </p:val>
-                                        </p:tav>
-                                      </p:tavLst>
-                                    </p:anim>
-                                  </p:childTnLst>
-                                </p:cTn>
-                              </p:par>
-                            </p:childTnLst>
-                          </p:cTn>
-                        </p:par>
-                      </p:childTnLst>
-                    </p:cTn>
-                  </p:par>
-                </p:childTnLst>
-              </p:cTn>
-              <p:prevCondLst>
-                <p:cond evt="onPrev" delay="0">
-                  <p:tgtEl>
-                    <p:sldTgt/>
-                  </p:tgtEl>
-                </p:cond>
-              </p:prevCondLst>
-              <p:nextCondLst>
-                <p:cond evt="onNext" delay="0">
-                  <p:tgtEl>
-                    <p:sldTgt/>
-                  </p:tgtEl>
-                </p:cond>
-              </p:nextCondLst>
-            </p:seq>
-          </p:childTnLst>
-        </p:cTn>
-      </p:par>
-    </p:tnLst>
-    <p:bldLst>
-      <p:bldP spid="2" grpId="0"/>
-      <p:bldP spid="3" grpId="0" build="p"/>
-    </p:bldLst>
-  </p:timing>
-</p:sld>
-</file>
-
-<file path=ppt/slides/slide5.xml><?xml version="1.0" encoding="utf-8"?>
-<p:sld xmlns:a="http://schemas.openxmlformats.org/drawingml/2006/main" xmlns:r="http://schemas.openxmlformats.org/officeDocument/2006/relationships" xmlns:p="http://schemas.openxmlformats.org/presentationml/2006/main">
-  <p:cSld>
-    <p:spTree>
-      <p:nvGrpSpPr>
-        <p:cNvPr id="1" name=""/>
-        <p:cNvGrpSpPr/>
-        <p:nvPr/>
-      </p:nvGrpSpPr>
-      <p:grpSpPr>
-        <a:xfrm>
-          <a:off x="0" y="0"/>
-          <a:ext cx="0" cy="0"/>
-          <a:chOff x="0" y="0"/>
-          <a:chExt cx="0" cy="0"/>
-        </a:xfrm>
-      </p:grpSpPr>
-      <p:sp>
-        <p:nvSpPr>
-          <p:cNvPr id="2" name="Title 1">
-            <a:extLst>
-              <a:ext uri="{FF2B5EF4-FFF2-40B4-BE49-F238E27FC236}">
-                <a16:creationId xmlns:a16="http://schemas.microsoft.com/office/drawing/2014/main" id="{97BC34CC-2191-086A-75CD-07624340C7B3}"/>
-              </a:ext>
-            </a:extLst>
-          </p:cNvPr>
-          <p:cNvSpPr>
-            <a:spLocks noGrp="1"/>
-          </p:cNvSpPr>
-          <p:nvPr>
-            <p:ph type="title"/>
-          </p:nvPr>
-        </p:nvSpPr>
-        <p:spPr>
-          <a:xfrm>
-            <a:off x="1154953" y="973668"/>
-            <a:ext cx="9128734" cy="706964"/>
-          </a:xfrm>
-        </p:spPr>
-        <p:txBody>
-          <a:bodyPr>
-            <a:normAutofit/>
-          </a:bodyPr>
-          <a:lstStyle/>
-          <a:p>
-            <a:r>
-              <a:rPr lang="en-US" dirty="0"/>
-              <a:t>DOCKER COMPOSE</a:t>
-            </a:r>
-            <a:endParaRPr lang="en-IN" dirty="0"/>
-          </a:p>
-        </p:txBody>
-      </p:sp>
-      <p:sp>
-        <p:nvSpPr>
-          <p:cNvPr id="3" name="Content Placeholder 2">
-            <a:extLst>
-              <a:ext uri="{FF2B5EF4-FFF2-40B4-BE49-F238E27FC236}">
-                <a16:creationId xmlns:a16="http://schemas.microsoft.com/office/drawing/2014/main" id="{5188517A-DD37-A765-9F25-8A87477F3848}"/>
-              </a:ext>
-            </a:extLst>
-          </p:cNvPr>
-          <p:cNvSpPr>
-            <a:spLocks noGrp="1"/>
-          </p:cNvSpPr>
-          <p:nvPr>
-            <p:ph idx="1"/>
-          </p:nvPr>
-        </p:nvSpPr>
-        <p:spPr>
-          <a:xfrm>
-            <a:off x="404336" y="2179431"/>
-            <a:ext cx="8761412" cy="3416300"/>
-          </a:xfrm>
-        </p:spPr>
-        <p:txBody>
-          <a:bodyPr/>
-          <a:lstStyle/>
-          <a:p>
-            <a:r>
-              <a:rPr lang="en-US" sz="1400" dirty="0">
-                <a:solidFill>
-                  <a:srgbClr val="31859C"/>
-                </a:solidFill>
-              </a:rPr>
-              <a:t>Tool for defining and running multi-container</a:t>
-            </a:r>
-          </a:p>
-          <a:p>
-            <a:r>
-              <a:rPr lang="en-US" sz="1400" dirty="0">
-                <a:solidFill>
-                  <a:srgbClr val="31859C"/>
-                </a:solidFill>
-              </a:rPr>
-              <a:t>applications with Docker in a single file</a:t>
-            </a:r>
-          </a:p>
-          <a:p>
-            <a:r>
-              <a:rPr lang="en-US" sz="1400" dirty="0">
-                <a:solidFill>
-                  <a:srgbClr val="31859C"/>
-                </a:solidFill>
-              </a:rPr>
-              <a:t>Fast, isolated development environments using Docker.</a:t>
-            </a:r>
-          </a:p>
-          <a:p>
-            <a:r>
-              <a:rPr lang="en-US" sz="1400" dirty="0">
-                <a:solidFill>
-                  <a:srgbClr val="31859C"/>
-                </a:solidFill>
-              </a:rPr>
-              <a:t>Quick and easy to start</a:t>
-            </a:r>
-          </a:p>
-          <a:p>
-            <a:endParaRPr lang="en-IN" dirty="0"/>
-          </a:p>
-        </p:txBody>
-      </p:sp>
-      <p:pic>
-        <p:nvPicPr>
-          <p:cNvPr id="8" name="Picture 7">
-            <a:extLst>
-              <a:ext uri="{FF2B5EF4-FFF2-40B4-BE49-F238E27FC236}">
-                <a16:creationId xmlns:a16="http://schemas.microsoft.com/office/drawing/2014/main" id="{7FFE4B8D-5615-A5B7-0D32-8038948A5205}"/>
-              </a:ext>
-            </a:extLst>
-          </p:cNvPr>
-          <p:cNvPicPr>
-            <a:picLocks noChangeAspect="1"/>
-          </p:cNvPicPr>
-          <p:nvPr/>
-        </p:nvPicPr>
-        <p:blipFill>
-          <a:blip r:embed="rId2">
-            <a:extLst>
-              <a:ext uri="{28A0092B-C50C-407E-A947-70E740481C1C}">
-                <a14:useLocalDpi xmlns:a14="http://schemas.microsoft.com/office/drawing/2010/main" val="0"/>
-              </a:ext>
-            </a:extLst>
-          </a:blip>
-          <a:stretch>
-            <a:fillRect/>
-          </a:stretch>
-        </p:blipFill>
-        <p:spPr>
-          <a:xfrm>
-            <a:off x="144050" y="3577259"/>
-            <a:ext cx="6884360" cy="3280741"/>
-          </a:xfrm>
-          <a:prstGeom prst="rect">
-            <a:avLst/>
-          </a:prstGeom>
-        </p:spPr>
-      </p:pic>
-      <p:pic>
-        <p:nvPicPr>
-          <p:cNvPr id="10" name="Picture 9">
-            <a:extLst>
-              <a:ext uri="{FF2B5EF4-FFF2-40B4-BE49-F238E27FC236}">
-                <a16:creationId xmlns:a16="http://schemas.microsoft.com/office/drawing/2014/main" id="{F299BAE2-79FE-9972-A389-DAB5F1740E1B}"/>
-              </a:ext>
-            </a:extLst>
-          </p:cNvPr>
-          <p:cNvPicPr>
-            <a:picLocks noChangeAspect="1"/>
-          </p:cNvPicPr>
-          <p:nvPr/>
-        </p:nvPicPr>
-        <p:blipFill>
-          <a:blip r:embed="rId3">
-            <a:extLst>
-              <a:ext uri="{28A0092B-C50C-407E-A947-70E740481C1C}">
-                <a14:useLocalDpi xmlns:a14="http://schemas.microsoft.com/office/drawing/2010/main" val="0"/>
-              </a:ext>
-            </a:extLst>
-          </a:blip>
-          <a:stretch>
-            <a:fillRect/>
-          </a:stretch>
-        </p:blipFill>
-        <p:spPr>
-          <a:xfrm>
-            <a:off x="6884360" y="2394045"/>
-            <a:ext cx="5307640" cy="4463955"/>
-          </a:xfrm>
-          <a:prstGeom prst="rect">
-            <a:avLst/>
-          </a:prstGeom>
-        </p:spPr>
-      </p:pic>
-    </p:spTree>
-    <p:extLst>
-      <p:ext uri="{BB962C8B-B14F-4D97-AF65-F5344CB8AC3E}">
-        <p14:creationId xmlns:p14="http://schemas.microsoft.com/office/powerpoint/2010/main" val="2454311313"/>
-      </p:ext>
-    </p:extLst>
-  </p:cSld>
-  <p:clrMapOvr>
-    <a:masterClrMapping/>
-  </p:clrMapOvr>
-  <p:timing>
-    <p:tnLst>
-      <p:par>
-        <p:cTn id="1" dur="indefinite" restart="never" nodeType="tmRoot">
-          <p:childTnLst>
-            <p:seq concurrent="1" nextAc="seek">
-              <p:cTn id="2" dur="indefinite" nodeType="mainSeq">
-                <p:childTnLst>
-                  <p:par>
-                    <p:cTn id="3" fill="hold">
-                      <p:stCondLst>
-                        <p:cond delay="indefinite"/>
-                      </p:stCondLst>
-                      <p:childTnLst>
-                        <p:par>
-                          <p:cTn id="4" fill="hold">
-                            <p:stCondLst>
-                              <p:cond delay="0"/>
-                            </p:stCondLst>
-                            <p:childTnLst>
-                              <p:par>
-                                <p:cTn id="5" presetID="2" presetClass="entr" presetSubtype="4" fill="hold" grpId="0" nodeType="clickEffect">
-                                  <p:stCondLst>
-                                    <p:cond delay="0"/>
-                                  </p:stCondLst>
-                                  <p:childTnLst>
-                                    <p:set>
-                                      <p:cBhvr>
-                                        <p:cTn id="6" dur="1" fill="hold">
-                                          <p:stCondLst>
-                                            <p:cond delay="0"/>
-                                          </p:stCondLst>
-                                        </p:cTn>
-                                        <p:tgtEl>
-                                          <p:spTgt spid="2"/>
-                                        </p:tgtEl>
-                                        <p:attrNameLst>
-                                          <p:attrName>style.visibility</p:attrName>
-                                        </p:attrNameLst>
-                                      </p:cBhvr>
-                                      <p:to>
-                                        <p:strVal val="visible"/>
-                                      </p:to>
-                                    </p:set>
-                                    <p:anim calcmode="lin" valueType="num">
-                                      <p:cBhvr additive="base">
-                                        <p:cTn id="7" dur="500" fill="hold"/>
-                                        <p:tgtEl>
-                                          <p:spTgt spid="2"/>
-                                        </p:tgtEl>
-                                        <p:attrNameLst>
-                                          <p:attrName>ppt_x</p:attrName>
-                                        </p:attrNameLst>
-                                      </p:cBhvr>
-                                      <p:tavLst>
-                                        <p:tav tm="0">
-                                          <p:val>
-                                            <p:strVal val="#ppt_x"/>
-                                          </p:val>
-                                        </p:tav>
-                                        <p:tav tm="100000">
-                                          <p:val>
-                                            <p:strVal val="#ppt_x"/>
-                                          </p:val>
-                                        </p:tav>
-                                      </p:tavLst>
-                                    </p:anim>
-                                    <p:anim calcmode="lin" valueType="num">
-                                      <p:cBhvr additive="base">
-                                        <p:cTn id="8" dur="500" fill="hold"/>
-                                        <p:tgtEl>
-                                          <p:spTgt spid="2"/>
-                                        </p:tgtEl>
-                                        <p:attrNameLst>
-                                          <p:attrName>ppt_y</p:attrName>
-                                        </p:attrNameLst>
-                                      </p:cBhvr>
-                                      <p:tavLst>
-                                        <p:tav tm="0">
-                                          <p:val>
-                                            <p:strVal val="1+#ppt_h/2"/>
-                                          </p:val>
-                                        </p:tav>
-                                        <p:tav tm="100000">
-                                          <p:val>
-                                            <p:strVal val="#ppt_y"/>
-                                          </p:val>
-                                        </p:tav>
-                                      </p:tavLst>
-                                    </p:anim>
-                                  </p:childTnLst>
-                                </p:cTn>
-                              </p:par>
-                            </p:childTnLst>
-                          </p:cTn>
-                        </p:par>
-                      </p:childTnLst>
-                    </p:cTn>
-                  </p:par>
-                  <p:par>
-                    <p:cTn id="9" fill="hold">
-                      <p:stCondLst>
-                        <p:cond delay="indefinite"/>
-                      </p:stCondLst>
-                      <p:childTnLst>
-                        <p:par>
-                          <p:cTn id="10" fill="hold">
-                            <p:stCondLst>
-                              <p:cond delay="0"/>
-                            </p:stCondLst>
-                            <p:childTnLst>
-                              <p:par>
-                                <p:cTn id="11" presetID="42" presetClass="entr" presetSubtype="0" fill="hold" grpId="0" nodeType="clickEffect">
-                                  <p:stCondLst>
-                                    <p:cond delay="0"/>
-                                  </p:stCondLst>
-                                  <p:childTnLst>
-                                    <p:set>
-                                      <p:cBhvr>
-                                        <p:cTn id="12" dur="1" fill="hold">
-                                          <p:stCondLst>
-                                            <p:cond delay="0"/>
-                                          </p:stCondLst>
-                                        </p:cTn>
-                                        <p:tgtEl>
-                                          <p:spTgt spid="3">
-                                            <p:txEl>
-                                              <p:pRg st="0" end="0"/>
-                                            </p:txEl>
-                                          </p:spTgt>
-                                        </p:tgtEl>
-                                        <p:attrNameLst>
-                                          <p:attrName>style.visibility</p:attrName>
-                                        </p:attrNameLst>
-                                      </p:cBhvr>
-                                      <p:to>
-                                        <p:strVal val="visible"/>
-                                      </p:to>
-                                    </p:set>
-                                    <p:animEffect transition="in" filter="fade">
-                                      <p:cBhvr>
-                                        <p:cTn id="13" dur="1000"/>
-                                        <p:tgtEl>
-                                          <p:spTgt spid="3">
-                                            <p:txEl>
-                                              <p:pRg st="0" end="0"/>
-                                            </p:txEl>
-                                          </p:spTgt>
-                                        </p:tgtEl>
-                                      </p:cBhvr>
-                                    </p:animEffect>
-                                    <p:anim calcmode="lin" valueType="num">
-                                      <p:cBhvr>
-                                        <p:cTn id="14" dur="1000" fill="hold"/>
-                                        <p:tgtEl>
-                                          <p:spTgt spid="3">
-                                            <p:txEl>
-                                              <p:pRg st="0" end="0"/>
-                                            </p:txEl>
-                                          </p:spTgt>
-                                        </p:tgtEl>
-                                        <p:attrNameLst>
-                                          <p:attrName>ppt_x</p:attrName>
-                                        </p:attrNameLst>
-                                      </p:cBhvr>
-                                      <p:tavLst>
-                                        <p:tav tm="0">
-                                          <p:val>
-                                            <p:strVal val="#ppt_x"/>
-                                          </p:val>
-                                        </p:tav>
-                                        <p:tav tm="100000">
-                                          <p:val>
-                                            <p:strVal val="#ppt_x"/>
-                                          </p:val>
-                                        </p:tav>
-                                      </p:tavLst>
-                                    </p:anim>
-                                    <p:anim calcmode="lin" valueType="num">
-                                      <p:cBhvr>
-                                        <p:cTn id="15" dur="1000" fill="hold"/>
-                                        <p:tgtEl>
-                                          <p:spTgt spid="3">
-                                            <p:txEl>
-                                              <p:pRg st="0" end="0"/>
-                                            </p:txEl>
-                                          </p:spTgt>
-                                        </p:tgtEl>
-                                        <p:attrNameLst>
-                                          <p:attrName>ppt_y</p:attrName>
-                                        </p:attrNameLst>
-                                      </p:cBhvr>
-                                      <p:tavLst>
-                                        <p:tav tm="0">
-                                          <p:val>
-                                            <p:strVal val="#ppt_y+.1"/>
-                                          </p:val>
-                                        </p:tav>
-                                        <p:tav tm="100000">
-                                          <p:val>
-                                            <p:strVal val="#ppt_y"/>
-                                          </p:val>
-                                        </p:tav>
-                                      </p:tavLst>
-                                    </p:anim>
-                                  </p:childTnLst>
-                                </p:cTn>
-                              </p:par>
-                            </p:childTnLst>
-                          </p:cTn>
-                        </p:par>
-                      </p:childTnLst>
-                    </p:cTn>
-                  </p:par>
-                  <p:par>
-                    <p:cTn id="16" fill="hold">
-                      <p:stCondLst>
-                        <p:cond delay="indefinite"/>
-                      </p:stCondLst>
-                      <p:childTnLst>
-                        <p:par>
-                          <p:cTn id="17" fill="hold">
-                            <p:stCondLst>
-                              <p:cond delay="0"/>
-                            </p:stCondLst>
-                            <p:childTnLst>
-                              <p:par>
-                                <p:cTn id="18" presetID="42" presetClass="entr" presetSubtype="0" fill="hold" grpId="0" nodeType="clickEffect">
-                                  <p:stCondLst>
-                                    <p:cond delay="0"/>
-                                  </p:stCondLst>
-                                  <p:childTnLst>
-                                    <p:set>
-                                      <p:cBhvr>
-                                        <p:cTn id="19" dur="1" fill="hold">
-                                          <p:stCondLst>
-                                            <p:cond delay="0"/>
-                                          </p:stCondLst>
-                                        </p:cTn>
-                                        <p:tgtEl>
-                                          <p:spTgt spid="3">
-                                            <p:txEl>
-                                              <p:pRg st="1" end="1"/>
-                                            </p:txEl>
-                                          </p:spTgt>
-                                        </p:tgtEl>
-                                        <p:attrNameLst>
-                                          <p:attrName>style.visibility</p:attrName>
-                                        </p:attrNameLst>
-                                      </p:cBhvr>
-                                      <p:to>
-                                        <p:strVal val="visible"/>
-                                      </p:to>
-                                    </p:set>
-                                    <p:animEffect transition="in" filter="fade">
-                                      <p:cBhvr>
-                                        <p:cTn id="20" dur="1000"/>
-                                        <p:tgtEl>
-                                          <p:spTgt spid="3">
-                                            <p:txEl>
-                                              <p:pRg st="1" end="1"/>
-                                            </p:txEl>
-                                          </p:spTgt>
-                                        </p:tgtEl>
-                                      </p:cBhvr>
-                                    </p:animEffect>
-                                    <p:anim calcmode="lin" valueType="num">
-                                      <p:cBhvr>
-                                        <p:cTn id="21" dur="1000" fill="hold"/>
-                                        <p:tgtEl>
-                                          <p:spTgt spid="3">
-                                            <p:txEl>
-                                              <p:pRg st="1" end="1"/>
-                                            </p:txEl>
-                                          </p:spTgt>
-                                        </p:tgtEl>
-                                        <p:attrNameLst>
-                                          <p:attrName>ppt_x</p:attrName>
-                                        </p:attrNameLst>
-                                      </p:cBhvr>
-                                      <p:tavLst>
-                                        <p:tav tm="0">
-                                          <p:val>
-                                            <p:strVal val="#ppt_x"/>
-                                          </p:val>
-                                        </p:tav>
-                                        <p:tav tm="100000">
-                                          <p:val>
-                                            <p:strVal val="#ppt_x"/>
-                                          </p:val>
-                                        </p:tav>
-                                      </p:tavLst>
-                                    </p:anim>
-                                    <p:anim calcmode="lin" valueType="num">
-                                      <p:cBhvr>
-                                        <p:cTn id="22" dur="1000" fill="hold"/>
-                                        <p:tgtEl>
-                                          <p:spTgt spid="3">
-                                            <p:txEl>
-                                              <p:pRg st="1" end="1"/>
-                                            </p:txEl>
-                                          </p:spTgt>
-                                        </p:tgtEl>
-                                        <p:attrNameLst>
-                                          <p:attrName>ppt_y</p:attrName>
-                                        </p:attrNameLst>
-                                      </p:cBhvr>
-                                      <p:tavLst>
-                                        <p:tav tm="0">
-                                          <p:val>
-                                            <p:strVal val="#ppt_y+.1"/>
-                                          </p:val>
-                                        </p:tav>
-                                        <p:tav tm="100000">
-                                          <p:val>
-                                            <p:strVal val="#ppt_y"/>
-                                          </p:val>
-                                        </p:tav>
-                                      </p:tavLst>
-                                    </p:anim>
-                                  </p:childTnLst>
-                                </p:cTn>
-                              </p:par>
-                            </p:childTnLst>
-                          </p:cTn>
-                        </p:par>
-                      </p:childTnLst>
-                    </p:cTn>
-                  </p:par>
-                  <p:par>
-                    <p:cTn id="23" fill="hold">
-                      <p:stCondLst>
-                        <p:cond delay="indefinite"/>
-                      </p:stCondLst>
-                      <p:childTnLst>
-                        <p:par>
-                          <p:cTn id="24" fill="hold">
-                            <p:stCondLst>
-                              <p:cond delay="0"/>
-                            </p:stCondLst>
-                            <p:childTnLst>
-                              <p:par>
-                                <p:cTn id="25" presetID="42" presetClass="entr" presetSubtype="0" fill="hold" grpId="0" nodeType="clickEffect">
-                                  <p:stCondLst>
-                                    <p:cond delay="0"/>
-                                  </p:stCondLst>
-                                  <p:childTnLst>
-                                    <p:set>
-                                      <p:cBhvr>
-                                        <p:cTn id="26" dur="1" fill="hold">
-                                          <p:stCondLst>
-                                            <p:cond delay="0"/>
-                                          </p:stCondLst>
-                                        </p:cTn>
-                                        <p:tgtEl>
-                                          <p:spTgt spid="3">
-                                            <p:txEl>
-                                              <p:pRg st="2" end="2"/>
-                                            </p:txEl>
-                                          </p:spTgt>
-                                        </p:tgtEl>
-                                        <p:attrNameLst>
-                                          <p:attrName>style.visibility</p:attrName>
-                                        </p:attrNameLst>
-                                      </p:cBhvr>
-                                      <p:to>
-                                        <p:strVal val="visible"/>
-                                      </p:to>
-                                    </p:set>
-                                    <p:animEffect transition="in" filter="fade">
-                                      <p:cBhvr>
-                                        <p:cTn id="27" dur="1000"/>
-                                        <p:tgtEl>
-                                          <p:spTgt spid="3">
-                                            <p:txEl>
-                                              <p:pRg st="2" end="2"/>
-                                            </p:txEl>
-                                          </p:spTgt>
-                                        </p:tgtEl>
-                                      </p:cBhvr>
-                                    </p:animEffect>
-                                    <p:anim calcmode="lin" valueType="num">
-                                      <p:cBhvr>
-                                        <p:cTn id="28" dur="1000" fill="hold"/>
-                                        <p:tgtEl>
-                                          <p:spTgt spid="3">
-                                            <p:txEl>
-                                              <p:pRg st="2" end="2"/>
-                                            </p:txEl>
-                                          </p:spTgt>
-                                        </p:tgtEl>
-                                        <p:attrNameLst>
-                                          <p:attrName>ppt_x</p:attrName>
-                                        </p:attrNameLst>
-                                      </p:cBhvr>
-                                      <p:tavLst>
-                                        <p:tav tm="0">
-                                          <p:val>
-                                            <p:strVal val="#ppt_x"/>
-                                          </p:val>
-                                        </p:tav>
-                                        <p:tav tm="100000">
-                                          <p:val>
-                                            <p:strVal val="#ppt_x"/>
-                                          </p:val>
-                                        </p:tav>
-                                      </p:tavLst>
-                                    </p:anim>
-                                    <p:anim calcmode="lin" valueType="num">
-                                      <p:cBhvr>
-                                        <p:cTn id="29" dur="1000" fill="hold"/>
-                                        <p:tgtEl>
-                                          <p:spTgt spid="3">
-                                            <p:txEl>
-                                              <p:pRg st="2" end="2"/>
-                                            </p:txEl>
-                                          </p:spTgt>
-                                        </p:tgtEl>
-                                        <p:attrNameLst>
-                                          <p:attrName>ppt_y</p:attrName>
-                                        </p:attrNameLst>
-                                      </p:cBhvr>
-                                      <p:tavLst>
-                                        <p:tav tm="0">
-                                          <p:val>
-                                            <p:strVal val="#ppt_y+.1"/>
-                                          </p:val>
-                                        </p:tav>
-                                        <p:tav tm="100000">
-                                          <p:val>
-                                            <p:strVal val="#ppt_y"/>
-                                          </p:val>
-                                        </p:tav>
-                                      </p:tavLst>
-                                    </p:anim>
-                                  </p:childTnLst>
-                                </p:cTn>
-                              </p:par>
-                            </p:childTnLst>
-                          </p:cTn>
-                        </p:par>
-                      </p:childTnLst>
-                    </p:cTn>
-                  </p:par>
-                  <p:par>
-                    <p:cTn id="30" fill="hold">
-                      <p:stCondLst>
-                        <p:cond delay="indefinite"/>
-                      </p:stCondLst>
-                      <p:childTnLst>
-                        <p:par>
-                          <p:cTn id="31" fill="hold">
-                            <p:stCondLst>
-                              <p:cond delay="0"/>
-                            </p:stCondLst>
-                            <p:childTnLst>
-                              <p:par>
-                                <p:cTn id="32" presetID="42" presetClass="entr" presetSubtype="0" fill="hold" grpId="0" nodeType="clickEffect">
-                                  <p:stCondLst>
-                                    <p:cond delay="0"/>
-                                  </p:stCondLst>
-                                  <p:childTnLst>
-                                    <p:set>
-                                      <p:cBhvr>
-                                        <p:cTn id="33" dur="1" fill="hold">
-                                          <p:stCondLst>
-                                            <p:cond delay="0"/>
-                                          </p:stCondLst>
-                                        </p:cTn>
-                                        <p:tgtEl>
-                                          <p:spTgt spid="3">
-                                            <p:txEl>
-                                              <p:pRg st="3" end="3"/>
-                                            </p:txEl>
-                                          </p:spTgt>
-                                        </p:tgtEl>
-                                        <p:attrNameLst>
-                                          <p:attrName>style.visibility</p:attrName>
-                                        </p:attrNameLst>
-                                      </p:cBhvr>
-                                      <p:to>
-                                        <p:strVal val="visible"/>
-                                      </p:to>
-                                    </p:set>
-                                    <p:animEffect transition="in" filter="fade">
-                                      <p:cBhvr>
-                                        <p:cTn id="34" dur="1000"/>
-                                        <p:tgtEl>
-                                          <p:spTgt spid="3">
-                                            <p:txEl>
-                                              <p:pRg st="3" end="3"/>
-                                            </p:txEl>
-                                          </p:spTgt>
-                                        </p:tgtEl>
-                                      </p:cBhvr>
-                                    </p:animEffect>
-                                    <p:anim calcmode="lin" valueType="num">
-                                      <p:cBhvr>
-                                        <p:cTn id="35" dur="1000" fill="hold"/>
-                                        <p:tgtEl>
-                                          <p:spTgt spid="3">
-                                            <p:txEl>
-                                              <p:pRg st="3" end="3"/>
-                                            </p:txEl>
-                                          </p:spTgt>
-                                        </p:tgtEl>
-                                        <p:attrNameLst>
-                                          <p:attrName>ppt_x</p:attrName>
-                                        </p:attrNameLst>
-                                      </p:cBhvr>
-                                      <p:tavLst>
-                                        <p:tav tm="0">
-                                          <p:val>
-                                            <p:strVal val="#ppt_x"/>
-                                          </p:val>
-                                        </p:tav>
-                                        <p:tav tm="100000">
-                                          <p:val>
-                                            <p:strVal val="#ppt_x"/>
-                                          </p:val>
-                                        </p:tav>
-                                      </p:tavLst>
-                                    </p:anim>
-                                    <p:anim calcmode="lin" valueType="num">
-                                      <p:cBhvr>
-                                        <p:cTn id="36" dur="1000" fill="hold"/>
-                                        <p:tgtEl>
-                                          <p:spTgt spid="3">
-                                            <p:txEl>
-                                              <p:pRg st="3" end="3"/>
-                                            </p:txEl>
-                                          </p:spTgt>
-                                        </p:tgtEl>
-                                        <p:attrNameLst>
-                                          <p:attrName>ppt_y</p:attrName>
-                                        </p:attrNameLst>
-                                      </p:cBhvr>
-                                      <p:tavLst>
-                                        <p:tav tm="0">
-                                          <p:val>
-                                            <p:strVal val="#ppt_y+.1"/>
-                                          </p:val>
-                                        </p:tav>
-                                        <p:tav tm="100000">
-                                          <p:val>
-                                            <p:strVal val="#ppt_y"/>
-                                          </p:val>
-                                        </p:tav>
-                                      </p:tavLst>
-                                    </p:anim>
-                                  </p:childTnLst>
-                                </p:cTn>
-                              </p:par>
-                            </p:childTnLst>
-                          </p:cTn>
-                        </p:par>
-                      </p:childTnLst>
-                    </p:cTn>
-                  </p:par>
-                  <p:par>
-                    <p:cTn id="37" fill="hold">
-                      <p:stCondLst>
-                        <p:cond delay="indefinite"/>
-                      </p:stCondLst>
-                      <p:childTnLst>
-                        <p:par>
-                          <p:cTn id="38" fill="hold">
-                            <p:stCondLst>
-                              <p:cond delay="0"/>
-                            </p:stCondLst>
-                            <p:childTnLst>
-                              <p:par>
-                                <p:cTn id="39" presetID="42" presetClass="entr" presetSubtype="0" fill="hold" nodeType="clickEffect">
-                                  <p:stCondLst>
-                                    <p:cond delay="0"/>
-                                  </p:stCondLst>
-                                  <p:childTnLst>
-                                    <p:set>
-                                      <p:cBhvr>
-                                        <p:cTn id="40" dur="1" fill="hold">
-                                          <p:stCondLst>
-                                            <p:cond delay="0"/>
-                                          </p:stCondLst>
-                                        </p:cTn>
-                                        <p:tgtEl>
-                                          <p:spTgt spid="8"/>
-                                        </p:tgtEl>
-                                        <p:attrNameLst>
-                                          <p:attrName>style.visibility</p:attrName>
-                                        </p:attrNameLst>
-                                      </p:cBhvr>
-                                      <p:to>
-                                        <p:strVal val="visible"/>
-                                      </p:to>
-                                    </p:set>
-                                    <p:animEffect transition="in" filter="fade">
-                                      <p:cBhvr>
-                                        <p:cTn id="41" dur="1000"/>
-                                        <p:tgtEl>
-                                          <p:spTgt spid="8"/>
-                                        </p:tgtEl>
-                                      </p:cBhvr>
-                                    </p:animEffect>
-                                    <p:anim calcmode="lin" valueType="num">
-                                      <p:cBhvr>
-                                        <p:cTn id="42" dur="1000" fill="hold"/>
-                                        <p:tgtEl>
-                                          <p:spTgt spid="8"/>
-                                        </p:tgtEl>
-                                        <p:attrNameLst>
-                                          <p:attrName>ppt_x</p:attrName>
-                                        </p:attrNameLst>
-                                      </p:cBhvr>
-                                      <p:tavLst>
-                                        <p:tav tm="0">
-                                          <p:val>
-                                            <p:strVal val="#ppt_x"/>
-                                          </p:val>
-                                        </p:tav>
-                                        <p:tav tm="100000">
-                                          <p:val>
-                                            <p:strVal val="#ppt_x"/>
-                                          </p:val>
-                                        </p:tav>
-                                      </p:tavLst>
-                                    </p:anim>
-                                    <p:anim calcmode="lin" valueType="num">
-                                      <p:cBhvr>
-                                        <p:cTn id="43" dur="1000" fill="hold"/>
-                                        <p:tgtEl>
-                                          <p:spTgt spid="8"/>
-                                        </p:tgtEl>
-                                        <p:attrNameLst>
-                                          <p:attrName>ppt_y</p:attrName>
-                                        </p:attrNameLst>
-                                      </p:cBhvr>
-                                      <p:tavLst>
-                                        <p:tav tm="0">
-                                          <p:val>
-                                            <p:strVal val="#ppt_y+.1"/>
-                                          </p:val>
-                                        </p:tav>
-                                        <p:tav tm="100000">
-                                          <p:val>
-                                            <p:strVal val="#ppt_y"/>
-                                          </p:val>
-                                        </p:tav>
-                                      </p:tavLst>
-                                    </p:anim>
-                                  </p:childTnLst>
-                                </p:cTn>
-                              </p:par>
-                            </p:childTnLst>
-                          </p:cTn>
-                        </p:par>
-                      </p:childTnLst>
-                    </p:cTn>
-                  </p:par>
-                  <p:par>
-                    <p:cTn id="44" fill="hold">
-                      <p:stCondLst>
-                        <p:cond delay="indefinite"/>
-                      </p:stCondLst>
-                      <p:childTnLst>
-                        <p:par>
-                          <p:cTn id="45" fill="hold">
-                            <p:stCondLst>
-                              <p:cond delay="0"/>
-                            </p:stCondLst>
-                            <p:childTnLst>
-                              <p:par>
-                                <p:cTn id="46" presetID="42" presetClass="entr" presetSubtype="0" fill="hold" nodeType="clickEffect">
-                                  <p:stCondLst>
-                                    <p:cond delay="0"/>
-                                  </p:stCondLst>
-                                  <p:childTnLst>
-                                    <p:set>
-                                      <p:cBhvr>
-                                        <p:cTn id="47" dur="1" fill="hold">
-                                          <p:stCondLst>
-                                            <p:cond delay="0"/>
-                                          </p:stCondLst>
-                                        </p:cTn>
-                                        <p:tgtEl>
-                                          <p:spTgt spid="10"/>
-                                        </p:tgtEl>
-                                        <p:attrNameLst>
-                                          <p:attrName>style.visibility</p:attrName>
-                                        </p:attrNameLst>
-                                      </p:cBhvr>
-                                      <p:to>
-                                        <p:strVal val="visible"/>
-                                      </p:to>
-                                    </p:set>
-                                    <p:animEffect transition="in" filter="fade">
-                                      <p:cBhvr>
-                                        <p:cTn id="48" dur="1000"/>
-                                        <p:tgtEl>
-                                          <p:spTgt spid="10"/>
-                                        </p:tgtEl>
-                                      </p:cBhvr>
-                                    </p:animEffect>
-                                    <p:anim calcmode="lin" valueType="num">
-                                      <p:cBhvr>
-                                        <p:cTn id="49" dur="1000" fill="hold"/>
-                                        <p:tgtEl>
-                                          <p:spTgt spid="10"/>
-                                        </p:tgtEl>
-                                        <p:attrNameLst>
-                                          <p:attrName>ppt_x</p:attrName>
-                                        </p:attrNameLst>
-                                      </p:cBhvr>
-                                      <p:tavLst>
-                                        <p:tav tm="0">
-                                          <p:val>
-                                            <p:strVal val="#ppt_x"/>
-                                          </p:val>
-                                        </p:tav>
-                                        <p:tav tm="100000">
-                                          <p:val>
-                                            <p:strVal val="#ppt_x"/>
-                                          </p:val>
-                                        </p:tav>
-                                      </p:tavLst>
-                                    </p:anim>
-                                    <p:anim calcmode="lin" valueType="num">
-                                      <p:cBhvr>
-                                        <p:cTn id="50" dur="1000" fill="hold"/>
-                                        <p:tgtEl>
-                                          <p:spTgt spid="10"/>
-                                        </p:tgtEl>
-                                        <p:attrNameLst>
-                                          <p:attrName>ppt_y</p:attrName>
-                                        </p:attrNameLst>
-                                      </p:cBhvr>
-                                      <p:tavLst>
-                                        <p:tav tm="0">
-                                          <p:val>
-                                            <p:strVal val="#ppt_y+.1"/>
-                                          </p:val>
-                                        </p:tav>
-                                        <p:tav tm="100000">
-                                          <p:val>
-                                            <p:strVal val="#ppt_y"/>
-                                          </p:val>
-                                        </p:tav>
-                                      </p:tavLst>
-                                    </p:anim>
-                                  </p:childTnLst>
-                                </p:cTn>
-                              </p:par>
-                            </p:childTnLst>
-                          </p:cTn>
-                        </p:par>
-                      </p:childTnLst>
-                    </p:cTn>
-                  </p:par>
-                </p:childTnLst>
-              </p:cTn>
-              <p:prevCondLst>
-                <p:cond evt="onPrev" delay="0">
-                  <p:tgtEl>
-                    <p:sldTgt/>
-                  </p:tgtEl>
-                </p:cond>
-              </p:prevCondLst>
-              <p:nextCondLst>
-                <p:cond evt="onNext" delay="0">
-                  <p:tgtEl>
-                    <p:sldTgt/>
-                  </p:tgtEl>
-                </p:cond>
-              </p:nextCondLst>
-            </p:seq>
-          </p:childTnLst>
-        </p:cTn>
-      </p:par>
-    </p:tnLst>
-    <p:bldLst>
-      <p:bldP spid="2" grpId="0"/>
-      <p:bldP spid="3" grpId="0" build="p"/>
-    </p:bldLst>
-  </p:timing>
-</p:sld>
-</file>
-
-<file path=ppt/slides/slide6.xml><?xml version="1.0" encoding="utf-8"?>
-<p:sld xmlns:a="http://schemas.openxmlformats.org/drawingml/2006/main" xmlns:r="http://schemas.openxmlformats.org/officeDocument/2006/relationships" xmlns:p="http://schemas.openxmlformats.org/presentationml/2006/main">
-  <p:cSld>
-    <p:spTree>
-      <p:nvGrpSpPr>
-        <p:cNvPr id="1" name=""/>
-        <p:cNvGrpSpPr/>
-        <p:nvPr/>
-      </p:nvGrpSpPr>
-      <p:grpSpPr>
-        <a:xfrm>
-          <a:off x="0" y="0"/>
-          <a:ext cx="0" cy="0"/>
-          <a:chOff x="0" y="0"/>
-          <a:chExt cx="0" cy="0"/>
-        </a:xfrm>
-      </p:grpSpPr>
-      <p:sp>
-        <p:nvSpPr>
-          <p:cNvPr id="2" name="Title 1">
-            <a:extLst>
-              <a:ext uri="{FF2B5EF4-FFF2-40B4-BE49-F238E27FC236}">
                 <a16:creationId xmlns:a16="http://schemas.microsoft.com/office/drawing/2014/main" id="{13182FD3-6C7D-6C4E-252E-520951EBDC12}"/>
               </a:ext>
             </a:extLst>
@@ -16213,7 +14449,7 @@
         </p:spPr>
         <p:txBody>
           <a:bodyPr>
-            <a:normAutofit fontScale="77500" lnSpcReduction="20000"/>
+            <a:normAutofit lnSpcReduction="10000"/>
           </a:bodyPr>
           <a:lstStyle/>
           <a:p>
@@ -16281,40 +14517,23 @@
               <a:buChar char="Ø"/>
             </a:pPr>
             <a:r>
-              <a:rPr lang="en-IN" dirty="0"/>
-              <a:t>https://www.freecodecamp.org/news/docker-mount-volume-guide-how-to-mount-a-local-directory/</a:t>
-            </a:r>
-          </a:p>
-          <a:p>
-            <a:r>
-              <a:rPr lang="en-IN" dirty="0"/>
-              <a:t>YAML Quick Reference - </a:t>
-            </a:r>
-            <a:r>
               <a:rPr lang="en-IN" dirty="0">
                 <a:hlinkClick r:id="rId3"/>
               </a:rPr>
-              <a:t>https://www.cloudbees.com/blog/yaml-tutorial-everything-you-need-get-started</a:t>
+              <a:t>https://www.freecodecamp.org/news/docker-mount-volume-guide-how-to-mount-a-local-directory/</a:t>
             </a:r>
             <a:endParaRPr lang="en-IN" dirty="0"/>
           </a:p>
           <a:p>
+            <a:pPr lvl="1">
+              <a:buFont typeface="Wingdings" panose="05000000000000000000" pitchFamily="2" charset="2"/>
+              <a:buChar char="Ø"/>
+            </a:pPr>
             <a:r>
-              <a:rPr lang="en-IN" dirty="0"/>
-              <a:t>JSON to YAML conversion</a:t>
+              <a:rPr lang="en-IN"/>
+              <a:t>https://docs.docker.com/build/building/multi-stage/</a:t>
             </a:r>
-          </a:p>
-          <a:p>
-            <a:r>
-              <a:rPr lang="en-IN" dirty="0"/>
-              <a:t>Docker Compose Details</a:t>
-            </a:r>
-          </a:p>
-          <a:p>
-            <a:r>
-              <a:rPr lang="en-IN" dirty="0"/>
-              <a:t>Docker Network Details</a:t>
-            </a:r>
+            <a:endParaRPr lang="en-IN" dirty="0"/>
           </a:p>
           <a:p>
             <a:r>

</xml_diff>